<commit_message>
strain finished, high dimension tensor left
</commit_message>
<xml_diff>
--- a/20220725_simulation/Deformable Simulation.pptx
+++ b/20220725_simulation/Deformable Simulation.pptx
@@ -4,6 +4,9 @@
   <p:sldMasterIdLst>
     <p:sldMasterId id="2147483648" r:id="rId1"/>
   </p:sldMasterIdLst>
+  <p:notesMasterIdLst>
+    <p:notesMasterId r:id="rId17"/>
+  </p:notesMasterIdLst>
   <p:sldIdLst>
     <p:sldId id="256" r:id="rId2"/>
     <p:sldId id="257" r:id="rId3"/>
@@ -19,6 +22,7 @@
     <p:sldId id="267" r:id="rId13"/>
     <p:sldId id="268" r:id="rId14"/>
     <p:sldId id="269" r:id="rId15"/>
+    <p:sldId id="270" r:id="rId16"/>
   </p:sldIdLst>
   <p:sldSz cx="12192000" cy="6858000"/>
   <p:notesSz cx="6858000" cy="9144000"/>
@@ -123,6 +127,648 @@
     </p:ext>
   </p:extLst>
 </p:presentation>
+</file>
+
+<file path=ppt/notesMasters/notesMaster1.xml><?xml version="1.0" encoding="utf-8"?>
+<p:notesMaster xmlns:a="http://schemas.openxmlformats.org/drawingml/2006/main" xmlns:r="http://schemas.openxmlformats.org/officeDocument/2006/relationships" xmlns:p="http://schemas.openxmlformats.org/presentationml/2006/main">
+  <p:cSld>
+    <p:bg>
+      <p:bgRef idx="1001">
+        <a:schemeClr val="bg1"/>
+      </p:bgRef>
+    </p:bg>
+    <p:spTree>
+      <p:nvGrpSpPr>
+        <p:cNvPr id="1" name=""/>
+        <p:cNvGrpSpPr/>
+        <p:nvPr/>
+      </p:nvGrpSpPr>
+      <p:grpSpPr>
+        <a:xfrm>
+          <a:off x="0" y="0"/>
+          <a:ext cx="0" cy="0"/>
+          <a:chOff x="0" y="0"/>
+          <a:chExt cx="0" cy="0"/>
+        </a:xfrm>
+      </p:grpSpPr>
+      <p:sp>
+        <p:nvSpPr>
+          <p:cNvPr id="2" name="页眉占位符 1"/>
+          <p:cNvSpPr>
+            <a:spLocks noGrp="1"/>
+          </p:cNvSpPr>
+          <p:nvPr>
+            <p:ph type="hdr" sz="quarter"/>
+          </p:nvPr>
+        </p:nvSpPr>
+        <p:spPr>
+          <a:xfrm>
+            <a:off x="0" y="0"/>
+            <a:ext cx="2971800" cy="458788"/>
+          </a:xfrm>
+          <a:prstGeom prst="rect">
+            <a:avLst/>
+          </a:prstGeom>
+        </p:spPr>
+        <p:txBody>
+          <a:bodyPr vert="horz" lIns="91440" tIns="45720" rIns="91440" bIns="45720" rtlCol="0"/>
+          <a:lstStyle>
+            <a:lvl1pPr algn="l">
+              <a:defRPr sz="1200"/>
+            </a:lvl1pPr>
+          </a:lstStyle>
+          <a:p>
+            <a:endParaRPr lang="zh-CN" altLang="en-US"/>
+          </a:p>
+        </p:txBody>
+      </p:sp>
+      <p:sp>
+        <p:nvSpPr>
+          <p:cNvPr id="3" name="日期占位符 2"/>
+          <p:cNvSpPr>
+            <a:spLocks noGrp="1"/>
+          </p:cNvSpPr>
+          <p:nvPr>
+            <p:ph type="dt" idx="1"/>
+          </p:nvPr>
+        </p:nvSpPr>
+        <p:spPr>
+          <a:xfrm>
+            <a:off x="3884613" y="0"/>
+            <a:ext cx="2971800" cy="458788"/>
+          </a:xfrm>
+          <a:prstGeom prst="rect">
+            <a:avLst/>
+          </a:prstGeom>
+        </p:spPr>
+        <p:txBody>
+          <a:bodyPr vert="horz" lIns="91440" tIns="45720" rIns="91440" bIns="45720" rtlCol="0"/>
+          <a:lstStyle>
+            <a:lvl1pPr algn="r">
+              <a:defRPr sz="1200"/>
+            </a:lvl1pPr>
+          </a:lstStyle>
+          <a:p>
+            <a:fld id="{63FDC6A3-7C42-4479-866C-9B859DB0775B}" type="datetimeFigureOut">
+              <a:rPr lang="zh-CN" altLang="en-US" smtClean="0"/>
+              <a:t>2022/7/22</a:t>
+            </a:fld>
+            <a:endParaRPr lang="zh-CN" altLang="en-US"/>
+          </a:p>
+        </p:txBody>
+      </p:sp>
+      <p:sp>
+        <p:nvSpPr>
+          <p:cNvPr id="4" name="幻灯片图像占位符 3"/>
+          <p:cNvSpPr>
+            <a:spLocks noGrp="1" noRot="1" noChangeAspect="1"/>
+          </p:cNvSpPr>
+          <p:nvPr>
+            <p:ph type="sldImg" idx="2"/>
+          </p:nvPr>
+        </p:nvSpPr>
+        <p:spPr>
+          <a:xfrm>
+            <a:off x="685800" y="1143000"/>
+            <a:ext cx="5486400" cy="3086100"/>
+          </a:xfrm>
+          <a:prstGeom prst="rect">
+            <a:avLst/>
+          </a:prstGeom>
+          <a:noFill/>
+          <a:ln w="12700">
+            <a:solidFill>
+              <a:prstClr val="black"/>
+            </a:solidFill>
+          </a:ln>
+        </p:spPr>
+        <p:txBody>
+          <a:bodyPr vert="horz" lIns="91440" tIns="45720" rIns="91440" bIns="45720" rtlCol="0" anchor="ctr"/>
+          <a:lstStyle/>
+          <a:p>
+            <a:endParaRPr lang="zh-CN" altLang="en-US"/>
+          </a:p>
+        </p:txBody>
+      </p:sp>
+      <p:sp>
+        <p:nvSpPr>
+          <p:cNvPr id="5" name="备注占位符 4"/>
+          <p:cNvSpPr>
+            <a:spLocks noGrp="1"/>
+          </p:cNvSpPr>
+          <p:nvPr>
+            <p:ph type="body" sz="quarter" idx="3"/>
+          </p:nvPr>
+        </p:nvSpPr>
+        <p:spPr>
+          <a:xfrm>
+            <a:off x="685800" y="4400550"/>
+            <a:ext cx="5486400" cy="3600450"/>
+          </a:xfrm>
+          <a:prstGeom prst="rect">
+            <a:avLst/>
+          </a:prstGeom>
+        </p:spPr>
+        <p:txBody>
+          <a:bodyPr vert="horz" lIns="91440" tIns="45720" rIns="91440" bIns="45720" rtlCol="0"/>
+          <a:lstStyle/>
+          <a:p>
+            <a:pPr lvl="0"/>
+            <a:r>
+              <a:rPr lang="zh-CN" altLang="en-US"/>
+              <a:t>单击此处编辑母版文本样式</a:t>
+            </a:r>
+          </a:p>
+          <a:p>
+            <a:pPr lvl="1"/>
+            <a:r>
+              <a:rPr lang="zh-CN" altLang="en-US"/>
+              <a:t>二级</a:t>
+            </a:r>
+          </a:p>
+          <a:p>
+            <a:pPr lvl="2"/>
+            <a:r>
+              <a:rPr lang="zh-CN" altLang="en-US"/>
+              <a:t>三级</a:t>
+            </a:r>
+          </a:p>
+          <a:p>
+            <a:pPr lvl="3"/>
+            <a:r>
+              <a:rPr lang="zh-CN" altLang="en-US"/>
+              <a:t>四级</a:t>
+            </a:r>
+          </a:p>
+          <a:p>
+            <a:pPr lvl="4"/>
+            <a:r>
+              <a:rPr lang="zh-CN" altLang="en-US"/>
+              <a:t>五级</a:t>
+            </a:r>
+          </a:p>
+        </p:txBody>
+      </p:sp>
+      <p:sp>
+        <p:nvSpPr>
+          <p:cNvPr id="6" name="页脚占位符 5"/>
+          <p:cNvSpPr>
+            <a:spLocks noGrp="1"/>
+          </p:cNvSpPr>
+          <p:nvPr>
+            <p:ph type="ftr" sz="quarter" idx="4"/>
+          </p:nvPr>
+        </p:nvSpPr>
+        <p:spPr>
+          <a:xfrm>
+            <a:off x="0" y="8685213"/>
+            <a:ext cx="2971800" cy="458787"/>
+          </a:xfrm>
+          <a:prstGeom prst="rect">
+            <a:avLst/>
+          </a:prstGeom>
+        </p:spPr>
+        <p:txBody>
+          <a:bodyPr vert="horz" lIns="91440" tIns="45720" rIns="91440" bIns="45720" rtlCol="0" anchor="b"/>
+          <a:lstStyle>
+            <a:lvl1pPr algn="l">
+              <a:defRPr sz="1200"/>
+            </a:lvl1pPr>
+          </a:lstStyle>
+          <a:p>
+            <a:endParaRPr lang="zh-CN" altLang="en-US"/>
+          </a:p>
+        </p:txBody>
+      </p:sp>
+      <p:sp>
+        <p:nvSpPr>
+          <p:cNvPr id="7" name="灯片编号占位符 6"/>
+          <p:cNvSpPr>
+            <a:spLocks noGrp="1"/>
+          </p:cNvSpPr>
+          <p:nvPr>
+            <p:ph type="sldNum" sz="quarter" idx="5"/>
+          </p:nvPr>
+        </p:nvSpPr>
+        <p:spPr>
+          <a:xfrm>
+            <a:off x="3884613" y="8685213"/>
+            <a:ext cx="2971800" cy="458787"/>
+          </a:xfrm>
+          <a:prstGeom prst="rect">
+            <a:avLst/>
+          </a:prstGeom>
+        </p:spPr>
+        <p:txBody>
+          <a:bodyPr vert="horz" lIns="91440" tIns="45720" rIns="91440" bIns="45720" rtlCol="0" anchor="b"/>
+          <a:lstStyle>
+            <a:lvl1pPr algn="r">
+              <a:defRPr sz="1200"/>
+            </a:lvl1pPr>
+          </a:lstStyle>
+          <a:p>
+            <a:fld id="{5A3394F7-11F7-462F-BBE6-C6B05860DB22}" type="slidenum">
+              <a:rPr lang="zh-CN" altLang="en-US" smtClean="0"/>
+              <a:t>‹#›</a:t>
+            </a:fld>
+            <a:endParaRPr lang="zh-CN" altLang="en-US"/>
+          </a:p>
+        </p:txBody>
+      </p:sp>
+    </p:spTree>
+    <p:extLst>
+      <p:ext uri="{BB962C8B-B14F-4D97-AF65-F5344CB8AC3E}">
+        <p14:creationId xmlns:p14="http://schemas.microsoft.com/office/powerpoint/2010/main" val="2947145832"/>
+      </p:ext>
+    </p:extLst>
+  </p:cSld>
+  <p:clrMap bg1="lt1" tx1="dk1" bg2="lt2" tx2="dk2" accent1="accent1" accent2="accent2" accent3="accent3" accent4="accent4" accent5="accent5" accent6="accent6" hlink="hlink" folHlink="folHlink"/>
+  <p:notesStyle>
+    <a:lvl1pPr marL="0" algn="l" defTabSz="914400" rtl="0" eaLnBrk="1" latinLnBrk="0" hangingPunct="1">
+      <a:defRPr sz="1200" kern="1200">
+        <a:solidFill>
+          <a:schemeClr val="tx1"/>
+        </a:solidFill>
+        <a:latin typeface="+mn-lt"/>
+        <a:ea typeface="+mn-ea"/>
+        <a:cs typeface="+mn-cs"/>
+      </a:defRPr>
+    </a:lvl1pPr>
+    <a:lvl2pPr marL="457200" algn="l" defTabSz="914400" rtl="0" eaLnBrk="1" latinLnBrk="0" hangingPunct="1">
+      <a:defRPr sz="1200" kern="1200">
+        <a:solidFill>
+          <a:schemeClr val="tx1"/>
+        </a:solidFill>
+        <a:latin typeface="+mn-lt"/>
+        <a:ea typeface="+mn-ea"/>
+        <a:cs typeface="+mn-cs"/>
+      </a:defRPr>
+    </a:lvl2pPr>
+    <a:lvl3pPr marL="914400" algn="l" defTabSz="914400" rtl="0" eaLnBrk="1" latinLnBrk="0" hangingPunct="1">
+      <a:defRPr sz="1200" kern="1200">
+        <a:solidFill>
+          <a:schemeClr val="tx1"/>
+        </a:solidFill>
+        <a:latin typeface="+mn-lt"/>
+        <a:ea typeface="+mn-ea"/>
+        <a:cs typeface="+mn-cs"/>
+      </a:defRPr>
+    </a:lvl3pPr>
+    <a:lvl4pPr marL="1371600" algn="l" defTabSz="914400" rtl="0" eaLnBrk="1" latinLnBrk="0" hangingPunct="1">
+      <a:defRPr sz="1200" kern="1200">
+        <a:solidFill>
+          <a:schemeClr val="tx1"/>
+        </a:solidFill>
+        <a:latin typeface="+mn-lt"/>
+        <a:ea typeface="+mn-ea"/>
+        <a:cs typeface="+mn-cs"/>
+      </a:defRPr>
+    </a:lvl4pPr>
+    <a:lvl5pPr marL="1828800" algn="l" defTabSz="914400" rtl="0" eaLnBrk="1" latinLnBrk="0" hangingPunct="1">
+      <a:defRPr sz="1200" kern="1200">
+        <a:solidFill>
+          <a:schemeClr val="tx1"/>
+        </a:solidFill>
+        <a:latin typeface="+mn-lt"/>
+        <a:ea typeface="+mn-ea"/>
+        <a:cs typeface="+mn-cs"/>
+      </a:defRPr>
+    </a:lvl5pPr>
+    <a:lvl6pPr marL="2286000" algn="l" defTabSz="914400" rtl="0" eaLnBrk="1" latinLnBrk="0" hangingPunct="1">
+      <a:defRPr sz="1200" kern="1200">
+        <a:solidFill>
+          <a:schemeClr val="tx1"/>
+        </a:solidFill>
+        <a:latin typeface="+mn-lt"/>
+        <a:ea typeface="+mn-ea"/>
+        <a:cs typeface="+mn-cs"/>
+      </a:defRPr>
+    </a:lvl6pPr>
+    <a:lvl7pPr marL="2743200" algn="l" defTabSz="914400" rtl="0" eaLnBrk="1" latinLnBrk="0" hangingPunct="1">
+      <a:defRPr sz="1200" kern="1200">
+        <a:solidFill>
+          <a:schemeClr val="tx1"/>
+        </a:solidFill>
+        <a:latin typeface="+mn-lt"/>
+        <a:ea typeface="+mn-ea"/>
+        <a:cs typeface="+mn-cs"/>
+      </a:defRPr>
+    </a:lvl7pPr>
+    <a:lvl8pPr marL="3200400" algn="l" defTabSz="914400" rtl="0" eaLnBrk="1" latinLnBrk="0" hangingPunct="1">
+      <a:defRPr sz="1200" kern="1200">
+        <a:solidFill>
+          <a:schemeClr val="tx1"/>
+        </a:solidFill>
+        <a:latin typeface="+mn-lt"/>
+        <a:ea typeface="+mn-ea"/>
+        <a:cs typeface="+mn-cs"/>
+      </a:defRPr>
+    </a:lvl8pPr>
+    <a:lvl9pPr marL="3657600" algn="l" defTabSz="914400" rtl="0" eaLnBrk="1" latinLnBrk="0" hangingPunct="1">
+      <a:defRPr sz="1200" kern="1200">
+        <a:solidFill>
+          <a:schemeClr val="tx1"/>
+        </a:solidFill>
+        <a:latin typeface="+mn-lt"/>
+        <a:ea typeface="+mn-ea"/>
+        <a:cs typeface="+mn-cs"/>
+      </a:defRPr>
+    </a:lvl9pPr>
+  </p:notesStyle>
+</p:notesMaster>
+</file>
+
+<file path=ppt/notesSlides/notesSlide1.xml><?xml version="1.0" encoding="utf-8"?>
+<p:notes xmlns:a="http://schemas.openxmlformats.org/drawingml/2006/main" xmlns:r="http://schemas.openxmlformats.org/officeDocument/2006/relationships" xmlns:p="http://schemas.openxmlformats.org/presentationml/2006/main">
+  <p:cSld>
+    <p:spTree>
+      <p:nvGrpSpPr>
+        <p:cNvPr id="1" name=""/>
+        <p:cNvGrpSpPr/>
+        <p:nvPr/>
+      </p:nvGrpSpPr>
+      <p:grpSpPr>
+        <a:xfrm>
+          <a:off x="0" y="0"/>
+          <a:ext cx="0" cy="0"/>
+          <a:chOff x="0" y="0"/>
+          <a:chExt cx="0" cy="0"/>
+        </a:xfrm>
+      </p:grpSpPr>
+      <p:sp>
+        <p:nvSpPr>
+          <p:cNvPr id="2" name="幻灯片图像占位符 1"/>
+          <p:cNvSpPr>
+            <a:spLocks noGrp="1" noRot="1" noChangeAspect="1"/>
+          </p:cNvSpPr>
+          <p:nvPr>
+            <p:ph type="sldImg"/>
+          </p:nvPr>
+        </p:nvSpPr>
+        <p:spPr/>
+      </p:sp>
+      <p:sp>
+        <p:nvSpPr>
+          <p:cNvPr id="3" name="备注占位符 2"/>
+          <p:cNvSpPr>
+            <a:spLocks noGrp="1"/>
+          </p:cNvSpPr>
+          <p:nvPr>
+            <p:ph type="body" idx="1"/>
+          </p:nvPr>
+        </p:nvSpPr>
+        <p:spPr/>
+        <p:txBody>
+          <a:bodyPr/>
+          <a:lstStyle/>
+          <a:p>
+            <a:r>
+              <a:rPr lang="zh-CN" altLang="en-US" dirty="0"/>
+              <a:t>在一个小的邻域内，可以把</a:t>
+            </a:r>
+            <a:r>
+              <a:rPr lang="en-US" altLang="zh-CN" dirty="0"/>
+              <a:t>x=</a:t>
+            </a:r>
+            <a:r>
+              <a:rPr lang="en-US" altLang="zh-CN" dirty="0" err="1"/>
+              <a:t>FX+t</a:t>
+            </a:r>
+            <a:r>
+              <a:rPr lang="zh-CN" altLang="en-US" dirty="0"/>
+              <a:t>视作成立</a:t>
+            </a:r>
+          </a:p>
+        </p:txBody>
+      </p:sp>
+      <p:sp>
+        <p:nvSpPr>
+          <p:cNvPr id="4" name="灯片编号占位符 3"/>
+          <p:cNvSpPr>
+            <a:spLocks noGrp="1"/>
+          </p:cNvSpPr>
+          <p:nvPr>
+            <p:ph type="sldNum" sz="quarter" idx="5"/>
+          </p:nvPr>
+        </p:nvSpPr>
+        <p:spPr/>
+        <p:txBody>
+          <a:bodyPr/>
+          <a:lstStyle/>
+          <a:p>
+            <a:fld id="{5A3394F7-11F7-462F-BBE6-C6B05860DB22}" type="slidenum">
+              <a:rPr lang="zh-CN" altLang="en-US" smtClean="0"/>
+              <a:t>13</a:t>
+            </a:fld>
+            <a:endParaRPr lang="zh-CN" altLang="en-US"/>
+          </a:p>
+        </p:txBody>
+      </p:sp>
+    </p:spTree>
+    <p:extLst>
+      <p:ext uri="{BB962C8B-B14F-4D97-AF65-F5344CB8AC3E}">
+        <p14:creationId xmlns:p14="http://schemas.microsoft.com/office/powerpoint/2010/main" val="2071982703"/>
+      </p:ext>
+    </p:extLst>
+  </p:cSld>
+  <p:clrMapOvr>
+    <a:masterClrMapping/>
+  </p:clrMapOvr>
+</p:notes>
+</file>
+
+<file path=ppt/notesSlides/notesSlide2.xml><?xml version="1.0" encoding="utf-8"?>
+<p:notes xmlns:a="http://schemas.openxmlformats.org/drawingml/2006/main" xmlns:r="http://schemas.openxmlformats.org/officeDocument/2006/relationships" xmlns:p="http://schemas.openxmlformats.org/presentationml/2006/main">
+  <p:cSld>
+    <p:spTree>
+      <p:nvGrpSpPr>
+        <p:cNvPr id="1" name=""/>
+        <p:cNvGrpSpPr/>
+        <p:nvPr/>
+      </p:nvGrpSpPr>
+      <p:grpSpPr>
+        <a:xfrm>
+          <a:off x="0" y="0"/>
+          <a:ext cx="0" cy="0"/>
+          <a:chOff x="0" y="0"/>
+          <a:chExt cx="0" cy="0"/>
+        </a:xfrm>
+      </p:grpSpPr>
+      <p:sp>
+        <p:nvSpPr>
+          <p:cNvPr id="2" name="幻灯片图像占位符 1"/>
+          <p:cNvSpPr>
+            <a:spLocks noGrp="1" noRot="1" noChangeAspect="1"/>
+          </p:cNvSpPr>
+          <p:nvPr>
+            <p:ph type="sldImg"/>
+          </p:nvPr>
+        </p:nvSpPr>
+        <p:spPr/>
+      </p:sp>
+      <p:sp>
+        <p:nvSpPr>
+          <p:cNvPr id="3" name="备注占位符 2"/>
+          <p:cNvSpPr>
+            <a:spLocks noGrp="1"/>
+          </p:cNvSpPr>
+          <p:nvPr>
+            <p:ph type="body" idx="1"/>
+          </p:nvPr>
+        </p:nvSpPr>
+        <p:spPr/>
+        <p:txBody>
+          <a:bodyPr/>
+          <a:lstStyle/>
+          <a:p>
+            <a:r>
+              <a:rPr lang="en-US" altLang="zh-CN" dirty="0"/>
+              <a:t>F</a:t>
+            </a:r>
+            <a:r>
+              <a:rPr lang="zh-CN" altLang="en-US" dirty="0"/>
+              <a:t>能够描述四面体的各顶点相对位置的关系，也就是说他其中不包含平移相关的量</a:t>
+            </a:r>
+          </a:p>
+        </p:txBody>
+      </p:sp>
+      <p:sp>
+        <p:nvSpPr>
+          <p:cNvPr id="4" name="灯片编号占位符 3"/>
+          <p:cNvSpPr>
+            <a:spLocks noGrp="1"/>
+          </p:cNvSpPr>
+          <p:nvPr>
+            <p:ph type="sldNum" sz="quarter" idx="5"/>
+          </p:nvPr>
+        </p:nvSpPr>
+        <p:spPr/>
+        <p:txBody>
+          <a:bodyPr/>
+          <a:lstStyle/>
+          <a:p>
+            <a:fld id="{5A3394F7-11F7-462F-BBE6-C6B05860DB22}" type="slidenum">
+              <a:rPr lang="zh-CN" altLang="en-US" smtClean="0"/>
+              <a:t>14</a:t>
+            </a:fld>
+            <a:endParaRPr lang="zh-CN" altLang="en-US"/>
+          </a:p>
+        </p:txBody>
+      </p:sp>
+    </p:spTree>
+    <p:extLst>
+      <p:ext uri="{BB962C8B-B14F-4D97-AF65-F5344CB8AC3E}">
+        <p14:creationId xmlns:p14="http://schemas.microsoft.com/office/powerpoint/2010/main" val="3753100529"/>
+      </p:ext>
+    </p:extLst>
+  </p:cSld>
+  <p:clrMapOvr>
+    <a:masterClrMapping/>
+  </p:clrMapOvr>
+</p:notes>
+</file>
+
+<file path=ppt/notesSlides/notesSlide3.xml><?xml version="1.0" encoding="utf-8"?>
+<p:notes xmlns:a="http://schemas.openxmlformats.org/drawingml/2006/main" xmlns:r="http://schemas.openxmlformats.org/officeDocument/2006/relationships" xmlns:p="http://schemas.openxmlformats.org/presentationml/2006/main">
+  <p:cSld>
+    <p:spTree>
+      <p:nvGrpSpPr>
+        <p:cNvPr id="1" name=""/>
+        <p:cNvGrpSpPr/>
+        <p:nvPr/>
+      </p:nvGrpSpPr>
+      <p:grpSpPr>
+        <a:xfrm>
+          <a:off x="0" y="0"/>
+          <a:ext cx="0" cy="0"/>
+          <a:chOff x="0" y="0"/>
+          <a:chExt cx="0" cy="0"/>
+        </a:xfrm>
+      </p:grpSpPr>
+      <p:sp>
+        <p:nvSpPr>
+          <p:cNvPr id="2" name="幻灯片图像占位符 1"/>
+          <p:cNvSpPr>
+            <a:spLocks noGrp="1" noRot="1" noChangeAspect="1"/>
+          </p:cNvSpPr>
+          <p:nvPr>
+            <p:ph type="sldImg"/>
+          </p:nvPr>
+        </p:nvSpPr>
+        <p:spPr/>
+      </p:sp>
+      <p:sp>
+        <p:nvSpPr>
+          <p:cNvPr id="3" name="备注占位符 2"/>
+          <p:cNvSpPr>
+            <a:spLocks noGrp="1"/>
+          </p:cNvSpPr>
+          <p:nvPr>
+            <p:ph type="body" idx="1"/>
+          </p:nvPr>
+        </p:nvSpPr>
+        <p:spPr/>
+        <p:txBody>
+          <a:bodyPr/>
+          <a:lstStyle/>
+          <a:p>
+            <a:r>
+              <a:rPr lang="zh-CN" altLang="en-US" dirty="0"/>
+              <a:t>怎么把</a:t>
+            </a:r>
+            <a:r>
+              <a:rPr lang="en-US" altLang="zh-CN" dirty="0"/>
+              <a:t>U</a:t>
+            </a:r>
+            <a:r>
+              <a:rPr lang="zh-CN" altLang="en-US" dirty="0"/>
+              <a:t>丢掉呢？用</a:t>
+            </a:r>
+            <a:r>
+              <a:rPr lang="en-US" altLang="zh-CN" dirty="0" err="1"/>
+              <a:t>svd</a:t>
+            </a:r>
+            <a:r>
+              <a:rPr lang="zh-CN" altLang="en-US" dirty="0"/>
+              <a:t>嘛，不太好，这并不优雅</a:t>
+            </a:r>
+          </a:p>
+        </p:txBody>
+      </p:sp>
+      <p:sp>
+        <p:nvSpPr>
+          <p:cNvPr id="4" name="灯片编号占位符 3"/>
+          <p:cNvSpPr>
+            <a:spLocks noGrp="1"/>
+          </p:cNvSpPr>
+          <p:nvPr>
+            <p:ph type="sldNum" sz="quarter" idx="5"/>
+          </p:nvPr>
+        </p:nvSpPr>
+        <p:spPr/>
+        <p:txBody>
+          <a:bodyPr/>
+          <a:lstStyle/>
+          <a:p>
+            <a:fld id="{5A3394F7-11F7-462F-BBE6-C6B05860DB22}" type="slidenum">
+              <a:rPr lang="zh-CN" altLang="en-US" smtClean="0"/>
+              <a:t>15</a:t>
+            </a:fld>
+            <a:endParaRPr lang="zh-CN" altLang="en-US"/>
+          </a:p>
+        </p:txBody>
+      </p:sp>
+    </p:spTree>
+    <p:extLst>
+      <p:ext uri="{BB962C8B-B14F-4D97-AF65-F5344CB8AC3E}">
+        <p14:creationId xmlns:p14="http://schemas.microsoft.com/office/powerpoint/2010/main" val="2952669848"/>
+      </p:ext>
+    </p:extLst>
+  </p:cSld>
+  <p:clrMapOvr>
+    <a:masterClrMapping/>
+  </p:clrMapOvr>
+</p:notes>
 </file>
 
 <file path=ppt/slideLayouts/slideLayout1.xml><?xml version="1.0" encoding="utf-8"?>
@@ -6074,8 +6720,8 @@
           </a:p>
         </p:txBody>
       </p:sp>
-      <mc:AlternateContent xmlns:mc="http://schemas.openxmlformats.org/markup-compatibility/2006">
-        <mc:Choice xmlns:a14="http://schemas.microsoft.com/office/drawing/2010/main" Requires="a14">
+      <mc:AlternateContent xmlns:mc="http://schemas.openxmlformats.org/markup-compatibility/2006" xmlns:a14="http://schemas.microsoft.com/office/drawing/2010/main">
+        <mc:Choice Requires="a14">
           <p:sp>
             <p:nvSpPr>
               <p:cNvPr id="5" name="内容占位符 2">
@@ -6669,7 +7315,7 @@
             </p:txBody>
           </p:sp>
         </mc:Choice>
-        <mc:Fallback>
+        <mc:Fallback xmlns="">
           <p:sp>
             <p:nvSpPr>
               <p:cNvPr id="5" name="内容占位符 2">
@@ -6693,7 +7339,7 @@
                 <a:avLst/>
               </a:prstGeom>
               <a:blipFill>
-                <a:blip r:embed="rId2"/>
+                <a:blip r:embed="rId3"/>
                 <a:stretch>
                   <a:fillRect l="-812" t="-2521"/>
                 </a:stretch>
@@ -6729,7 +7375,7 @@
           <p:nvPr/>
         </p:nvPicPr>
         <p:blipFill>
-          <a:blip r:embed="rId3">
+          <a:blip r:embed="rId4">
             <a:extLst>
               <a:ext uri="{28A0092B-C50C-407E-A947-70E740481C1C}">
                 <a14:useLocalDpi xmlns:a14="http://schemas.microsoft.com/office/drawing/2010/main" val="0"/>
@@ -6765,7 +7411,7 @@
           <p:nvPr/>
         </p:nvPicPr>
         <p:blipFill>
-          <a:blip r:embed="rId4">
+          <a:blip r:embed="rId5">
             <a:extLst>
               <a:ext uri="{28A0092B-C50C-407E-A947-70E740481C1C}">
                 <a14:useLocalDpi xmlns:a14="http://schemas.microsoft.com/office/drawing/2010/main" val="0"/>
@@ -6786,8 +7432,8 @@
           </a:prstGeom>
         </p:spPr>
       </p:pic>
-      <mc:AlternateContent xmlns:mc="http://schemas.openxmlformats.org/markup-compatibility/2006">
-        <mc:Choice xmlns:a14="http://schemas.microsoft.com/office/drawing/2010/main" Requires="a14">
+      <mc:AlternateContent xmlns:mc="http://schemas.openxmlformats.org/markup-compatibility/2006" xmlns:a14="http://schemas.microsoft.com/office/drawing/2010/main">
+        <mc:Choice Requires="a14">
           <p:sp>
             <p:nvSpPr>
               <p:cNvPr id="8" name="文本框 7">
@@ -6816,6 +7462,7 @@
               </a:bodyPr>
               <a:lstStyle/>
               <a:p>
+                <a:pPr/>
                 <a14:m>
                   <m:oMathPara xmlns:m="http://schemas.openxmlformats.org/officeDocument/2006/math">
                     <m:oMathParaPr>
@@ -6836,7 +7483,7 @@
             </p:txBody>
           </p:sp>
         </mc:Choice>
-        <mc:Fallback>
+        <mc:Fallback xmlns="">
           <p:sp>
             <p:nvSpPr>
               <p:cNvPr id="8" name="文本框 7">
@@ -6860,7 +7507,7 @@
                 <a:avLst/>
               </a:prstGeom>
               <a:blipFill>
-                <a:blip r:embed="rId5"/>
+                <a:blip r:embed="rId6"/>
                 <a:stretch>
                   <a:fillRect l="-21622" r="-21622" b="-6667"/>
                 </a:stretch>
@@ -6881,8 +7528,8 @@
           </p:sp>
         </mc:Fallback>
       </mc:AlternateContent>
-      <mc:AlternateContent xmlns:mc="http://schemas.openxmlformats.org/markup-compatibility/2006">
-        <mc:Choice xmlns:a14="http://schemas.microsoft.com/office/drawing/2010/main" Requires="a14">
+      <mc:AlternateContent xmlns:mc="http://schemas.openxmlformats.org/markup-compatibility/2006" xmlns:a14="http://schemas.microsoft.com/office/drawing/2010/main">
+        <mc:Choice Requires="a14">
           <p:sp>
             <p:nvSpPr>
               <p:cNvPr id="9" name="文本框 8">
@@ -6911,6 +7558,7 @@
               </a:bodyPr>
               <a:lstStyle/>
               <a:p>
+                <a:pPr/>
                 <a14:m>
                   <m:oMathPara xmlns:m="http://schemas.openxmlformats.org/officeDocument/2006/math">
                     <m:oMathParaPr>
@@ -6931,7 +7579,7 @@
             </p:txBody>
           </p:sp>
         </mc:Choice>
-        <mc:Fallback>
+        <mc:Fallback xmlns="">
           <p:sp>
             <p:nvSpPr>
               <p:cNvPr id="9" name="文本框 8">
@@ -6955,7 +7603,7 @@
                 <a:avLst/>
               </a:prstGeom>
               <a:blipFill>
-                <a:blip r:embed="rId6"/>
+                <a:blip r:embed="rId7"/>
                 <a:stretch>
                   <a:fillRect l="-15625" r="-15625"/>
                 </a:stretch>
@@ -7017,8 +7665,8 @@
           </a:fontRef>
         </p:style>
       </p:cxnSp>
-      <mc:AlternateContent xmlns:mc="http://schemas.openxmlformats.org/markup-compatibility/2006">
-        <mc:Choice xmlns:a14="http://schemas.microsoft.com/office/drawing/2010/main" Requires="a14">
+      <mc:AlternateContent xmlns:mc="http://schemas.openxmlformats.org/markup-compatibility/2006" xmlns:a14="http://schemas.microsoft.com/office/drawing/2010/main">
+        <mc:Choice Requires="a14">
           <p:sp>
             <p:nvSpPr>
               <p:cNvPr id="12" name="文本框 11">
@@ -7047,6 +7695,7 @@
               </a:bodyPr>
               <a:lstStyle/>
               <a:p>
+                <a:pPr/>
                 <a14:m>
                   <m:oMathPara xmlns:m="http://schemas.openxmlformats.org/officeDocument/2006/math">
                     <m:oMathParaPr>
@@ -7097,7 +7746,7 @@
             </p:txBody>
           </p:sp>
         </mc:Choice>
-        <mc:Fallback>
+        <mc:Fallback xmlns="">
           <p:sp>
             <p:nvSpPr>
               <p:cNvPr id="12" name="文本框 11">
@@ -7121,7 +7770,7 @@
                 <a:avLst/>
               </a:prstGeom>
               <a:blipFill>
-                <a:blip r:embed="rId7"/>
+                <a:blip r:embed="rId8"/>
                 <a:stretch>
                   <a:fillRect l="-3049" t="-4444" r="-8537" b="-35556"/>
                 </a:stretch>
@@ -7142,8 +7791,8 @@
           </p:sp>
         </mc:Fallback>
       </mc:AlternateContent>
-      <mc:AlternateContent xmlns:mc="http://schemas.openxmlformats.org/markup-compatibility/2006">
-        <mc:Choice xmlns:a14="http://schemas.microsoft.com/office/drawing/2010/main" Requires="a14">
+      <mc:AlternateContent xmlns:mc="http://schemas.openxmlformats.org/markup-compatibility/2006" xmlns:a14="http://schemas.microsoft.com/office/drawing/2010/main">
+        <mc:Choice Requires="a14">
           <p:sp>
             <p:nvSpPr>
               <p:cNvPr id="13" name="文本框 12">
@@ -7172,6 +7821,7 @@
               </a:bodyPr>
               <a:lstStyle/>
               <a:p>
+                <a:pPr/>
                 <a14:m>
                   <m:oMathPara xmlns:m="http://schemas.openxmlformats.org/officeDocument/2006/math">
                     <m:oMathParaPr>
@@ -7227,7 +7877,16 @@
                                   <a:rPr lang="en-US" altLang="zh-CN" b="0" i="0" smtClean="0">
                                     <a:latin typeface="Cambria Math" panose="02040503050406030204" pitchFamily="18" charset="0"/>
                                   </a:rPr>
-                                  <m:t>cos</m:t>
+                                  <m:t>c</m:t>
+                                </m:r>
+                                <m:r>
+                                  <m:rPr>
+                                    <m:sty m:val="p"/>
+                                  </m:rPr>
+                                  <a:rPr lang="en-US" altLang="zh-CN" b="0" i="0" smtClean="0">
+                                    <a:latin typeface="Cambria Math" panose="02040503050406030204" pitchFamily="18" charset="0"/>
+                                  </a:rPr>
+                                  <m:t>os</m:t>
                                 </m:r>
                                 <m:r>
                                   <m:rPr>
@@ -7236,7 +7895,13 @@
                                   <a:rPr lang="en-US" altLang="zh-CN" b="0" i="1" smtClean="0">
                                     <a:latin typeface="Cambria Math" panose="02040503050406030204" pitchFamily="18" charset="0"/>
                                   </a:rPr>
-                                  <m:t>⁡(</m:t>
+                                  <m:t>⁡</m:t>
+                                </m:r>
+                                <m:r>
+                                  <a:rPr lang="en-US" altLang="zh-CN" b="0" i="1" smtClean="0">
+                                    <a:latin typeface="Cambria Math" panose="02040503050406030204" pitchFamily="18" charset="0"/>
+                                  </a:rPr>
+                                  <m:t>(</m:t>
                                 </m:r>
                                 <m:r>
                                   <a:rPr lang="en-US" altLang="zh-CN" b="0" i="1" smtClean="0">
@@ -7445,7 +8110,7 @@
             </p:txBody>
           </p:sp>
         </mc:Choice>
-        <mc:Fallback>
+        <mc:Fallback xmlns="">
           <p:sp>
             <p:nvSpPr>
               <p:cNvPr id="13" name="文本框 12">
@@ -7469,7 +8134,7 @@
                 <a:avLst/>
               </a:prstGeom>
               <a:blipFill>
-                <a:blip r:embed="rId8"/>
+                <a:blip r:embed="rId9"/>
                 <a:stretch>
                   <a:fillRect/>
                 </a:stretch>
@@ -7490,8 +8155,8 @@
           </p:sp>
         </mc:Fallback>
       </mc:AlternateContent>
-      <mc:AlternateContent xmlns:mc="http://schemas.openxmlformats.org/markup-compatibility/2006">
-        <mc:Choice xmlns:a14="http://schemas.microsoft.com/office/drawing/2010/main" Requires="a14">
+      <mc:AlternateContent xmlns:mc="http://schemas.openxmlformats.org/markup-compatibility/2006" xmlns:a14="http://schemas.microsoft.com/office/drawing/2010/main">
+        <mc:Choice Requires="a14">
           <p:sp>
             <p:nvSpPr>
               <p:cNvPr id="14" name="文本框 13">
@@ -7520,6 +8185,7 @@
               </a:bodyPr>
               <a:lstStyle/>
               <a:p>
+                <a:pPr/>
                 <a14:m>
                   <m:oMathPara xmlns:m="http://schemas.openxmlformats.org/officeDocument/2006/math">
                     <m:oMathParaPr>
@@ -7747,7 +8413,7 @@
             </p:txBody>
           </p:sp>
         </mc:Choice>
-        <mc:Fallback>
+        <mc:Fallback xmlns="">
           <p:sp>
             <p:nvSpPr>
               <p:cNvPr id="14" name="文本框 13">
@@ -7771,7 +8437,7 @@
                 <a:avLst/>
               </a:prstGeom>
               <a:blipFill>
-                <a:blip r:embed="rId9"/>
+                <a:blip r:embed="rId10"/>
                 <a:stretch>
                   <a:fillRect/>
                 </a:stretch>
@@ -7792,8 +8458,8 @@
           </p:sp>
         </mc:Fallback>
       </mc:AlternateContent>
-      <mc:AlternateContent xmlns:mc="http://schemas.openxmlformats.org/markup-compatibility/2006">
-        <mc:Choice xmlns:a14="http://schemas.microsoft.com/office/drawing/2010/main" Requires="a14">
+      <mc:AlternateContent xmlns:mc="http://schemas.openxmlformats.org/markup-compatibility/2006" xmlns:a14="http://schemas.microsoft.com/office/drawing/2010/main">
+        <mc:Choice Requires="a14">
           <p:sp>
             <p:nvSpPr>
               <p:cNvPr id="17" name="文本框 16">
@@ -7822,6 +8488,7 @@
               </a:bodyPr>
               <a:lstStyle/>
               <a:p>
+                <a:pPr/>
                 <a14:m>
                   <m:oMathPara xmlns:m="http://schemas.openxmlformats.org/officeDocument/2006/math">
                     <m:oMathParaPr>
@@ -7848,7 +8515,7 @@
             </p:txBody>
           </p:sp>
         </mc:Choice>
-        <mc:Fallback>
+        <mc:Fallback xmlns="">
           <p:sp>
             <p:nvSpPr>
               <p:cNvPr id="17" name="文本框 16">
@@ -7872,7 +8539,7 @@
                 <a:avLst/>
               </a:prstGeom>
               <a:blipFill>
-                <a:blip r:embed="rId10"/>
+                <a:blip r:embed="rId11"/>
                 <a:stretch>
                   <a:fillRect l="-20513" r="-20513" b="-5882"/>
                 </a:stretch>
@@ -7893,8 +8560,8 @@
           </p:sp>
         </mc:Fallback>
       </mc:AlternateContent>
-      <mc:AlternateContent xmlns:mc="http://schemas.openxmlformats.org/markup-compatibility/2006">
-        <mc:Choice xmlns:a14="http://schemas.microsoft.com/office/drawing/2010/main" Requires="a14">
+      <mc:AlternateContent xmlns:mc="http://schemas.openxmlformats.org/markup-compatibility/2006" xmlns:a14="http://schemas.microsoft.com/office/drawing/2010/main">
+        <mc:Choice Requires="a14">
           <p:sp>
             <p:nvSpPr>
               <p:cNvPr id="18" name="文本框 17">
@@ -7923,6 +8590,7 @@
               </a:bodyPr>
               <a:lstStyle/>
               <a:p>
+                <a:pPr/>
                 <a14:m>
                   <m:oMathPara xmlns:m="http://schemas.openxmlformats.org/officeDocument/2006/math">
                     <m:oMathParaPr>
@@ -7953,7 +8621,7 @@
             </p:txBody>
           </p:sp>
         </mc:Choice>
-        <mc:Fallback>
+        <mc:Fallback xmlns="">
           <p:sp>
             <p:nvSpPr>
               <p:cNvPr id="18" name="文本框 17">
@@ -7977,7 +8645,7 @@
                 <a:avLst/>
               </a:prstGeom>
               <a:blipFill>
-                <a:blip r:embed="rId11"/>
+                <a:blip r:embed="rId12"/>
                 <a:stretch>
                   <a:fillRect l="-24138" r="-24138" b="-1961"/>
                 </a:stretch>
@@ -7998,8 +8666,8 @@
           </p:sp>
         </mc:Fallback>
       </mc:AlternateContent>
-      <mc:AlternateContent xmlns:mc="http://schemas.openxmlformats.org/markup-compatibility/2006">
-        <mc:Choice xmlns:a14="http://schemas.microsoft.com/office/drawing/2010/main" Requires="a14">
+      <mc:AlternateContent xmlns:mc="http://schemas.openxmlformats.org/markup-compatibility/2006" xmlns:a14="http://schemas.microsoft.com/office/drawing/2010/main">
+        <mc:Choice Requires="a14">
           <p:sp>
             <p:nvSpPr>
               <p:cNvPr id="19" name="文本框 18">
@@ -8028,6 +8696,7 @@
               </a:bodyPr>
               <a:lstStyle/>
               <a:p>
+                <a:pPr/>
                 <a14:m>
                   <m:oMathPara xmlns:m="http://schemas.openxmlformats.org/officeDocument/2006/math">
                     <m:oMathParaPr>
@@ -8079,7 +8748,7 @@
             </p:txBody>
           </p:sp>
         </mc:Choice>
-        <mc:Fallback>
+        <mc:Fallback xmlns="">
           <p:sp>
             <p:nvSpPr>
               <p:cNvPr id="19" name="文本框 18">
@@ -8103,7 +8772,7 @@
                 <a:avLst/>
               </a:prstGeom>
               <a:blipFill>
-                <a:blip r:embed="rId12"/>
+                <a:blip r:embed="rId13"/>
                 <a:stretch>
                   <a:fillRect l="-1887" r="-3302" b="-5882"/>
                 </a:stretch>
@@ -8234,7 +8903,7 @@
             <p:spPr>
               <a:xfrm>
                 <a:off x="990600" y="1978025"/>
-                <a:ext cx="10515600" cy="4351338"/>
+                <a:ext cx="10896600" cy="4351338"/>
               </a:xfrm>
               <a:prstGeom prst="rect">
                 <a:avLst/>
@@ -8526,6 +9195,72 @@
                     </m:r>
                   </m:oMath>
                 </a14:m>
+                <a:r>
+                  <a:rPr lang="en-US" altLang="zh-CN" sz="2400" dirty="0"/>
+                  <a:t>, so </a:t>
+                </a:r>
+                <a14:m>
+                  <m:oMath xmlns:m="http://schemas.openxmlformats.org/officeDocument/2006/math">
+                    <m:r>
+                      <a:rPr lang="en-US" altLang="zh-CN" sz="2400" i="1">
+                        <a:latin typeface="Cambria Math" panose="02040503050406030204" pitchFamily="18" charset="0"/>
+                      </a:rPr>
+                      <m:t>𝐸</m:t>
+                    </m:r>
+                    <m:r>
+                      <a:rPr lang="en-US" altLang="zh-CN" sz="2400" i="1">
+                        <a:latin typeface="Cambria Math" panose="02040503050406030204" pitchFamily="18" charset="0"/>
+                      </a:rPr>
+                      <m:t>=∑</m:t>
+                    </m:r>
+                    <m:r>
+                      <m:rPr>
+                        <m:sty m:val="p"/>
+                      </m:rPr>
+                      <a:rPr lang="en-US" altLang="zh-CN" sz="2400">
+                        <a:latin typeface="Cambria Math" panose="02040503050406030204" pitchFamily="18" charset="0"/>
+                      </a:rPr>
+                      <m:t>Ψ</m:t>
+                    </m:r>
+                    <m:r>
+                      <a:rPr lang="en-US" altLang="zh-CN" sz="2400" i="1">
+                        <a:latin typeface="Cambria Math" panose="02040503050406030204" pitchFamily="18" charset="0"/>
+                      </a:rPr>
+                      <m:t>(</m:t>
+                    </m:r>
+                    <m:sSub>
+                      <m:sSubPr>
+                        <m:ctrlPr>
+                          <a:rPr lang="en-US" altLang="zh-CN" sz="2400" i="1">
+                            <a:latin typeface="Cambria Math" panose="02040503050406030204" pitchFamily="18" charset="0"/>
+                          </a:rPr>
+                        </m:ctrlPr>
+                      </m:sSubPr>
+                      <m:e>
+                        <m:r>
+                          <a:rPr lang="en-US" altLang="zh-CN" sz="2400" i="1">
+                            <a:latin typeface="Cambria Math" panose="02040503050406030204" pitchFamily="18" charset="0"/>
+                          </a:rPr>
+                          <m:t>𝐹</m:t>
+                        </m:r>
+                      </m:e>
+                      <m:sub>
+                        <m:r>
+                          <a:rPr lang="en-US" altLang="zh-CN" sz="2400" i="1">
+                            <a:latin typeface="Cambria Math" panose="02040503050406030204" pitchFamily="18" charset="0"/>
+                          </a:rPr>
+                          <m:t>𝑒</m:t>
+                        </m:r>
+                      </m:sub>
+                    </m:sSub>
+                    <m:r>
+                      <a:rPr lang="en-US" altLang="zh-CN" sz="2400" i="1">
+                        <a:latin typeface="Cambria Math" panose="02040503050406030204" pitchFamily="18" charset="0"/>
+                      </a:rPr>
+                      <m:t>)</m:t>
+                    </m:r>
+                  </m:oMath>
+                </a14:m>
                 <a:endParaRPr lang="en-US" altLang="zh-CN" sz="2400" dirty="0"/>
               </a:p>
               <a:p>
@@ -8555,15 +9290,15 @@
             <p:spPr>
               <a:xfrm>
                 <a:off x="990600" y="1978025"/>
-                <a:ext cx="10515600" cy="4351338"/>
+                <a:ext cx="10896600" cy="4351338"/>
               </a:xfrm>
               <a:prstGeom prst="rect">
                 <a:avLst/>
               </a:prstGeom>
               <a:blipFill>
-                <a:blip r:embed="rId2"/>
+                <a:blip r:embed="rId3"/>
                 <a:stretch>
-                  <a:fillRect l="-812" t="-1821"/>
+                  <a:fillRect l="-783" t="-1821"/>
                 </a:stretch>
               </a:blipFill>
             </p:spPr>
@@ -8597,7 +9332,7 @@
           <p:nvPr/>
         </p:nvPicPr>
         <p:blipFill>
-          <a:blip r:embed="rId3">
+          <a:blip r:embed="rId4">
             <a:extLst>
               <a:ext uri="{28A0092B-C50C-407E-A947-70E740481C1C}">
                 <a14:useLocalDpi xmlns:a14="http://schemas.microsoft.com/office/drawing/2010/main" val="0"/>
@@ -8618,8 +9353,8 @@
           </a:prstGeom>
         </p:spPr>
       </p:pic>
-      <mc:AlternateContent xmlns:mc="http://schemas.openxmlformats.org/markup-compatibility/2006">
-        <mc:Choice xmlns:a14="http://schemas.microsoft.com/office/drawing/2010/main" Requires="a14">
+      <mc:AlternateContent xmlns:mc="http://schemas.openxmlformats.org/markup-compatibility/2006" xmlns:a14="http://schemas.microsoft.com/office/drawing/2010/main">
+        <mc:Choice Requires="a14">
           <p:sp>
             <p:nvSpPr>
               <p:cNvPr id="8" name="文本框 7">
@@ -8648,6 +9383,7 @@
               </a:bodyPr>
               <a:lstStyle/>
               <a:p>
+                <a:pPr/>
                 <a14:m>
                   <m:oMathPara xmlns:m="http://schemas.openxmlformats.org/officeDocument/2006/math">
                     <m:oMathParaPr>
@@ -8734,6 +9470,7 @@
                 <a:endParaRPr lang="en-US" altLang="zh-CN" sz="2000" dirty="0"/>
               </a:p>
               <a:p>
+                <a:pPr/>
                 <a14:m>
                   <m:oMathPara xmlns:m="http://schemas.openxmlformats.org/officeDocument/2006/math">
                     <m:oMathParaPr>
@@ -8820,6 +9557,7 @@
                 <a:endParaRPr lang="en-US" altLang="zh-CN" sz="2000" b="0" dirty="0"/>
               </a:p>
               <a:p>
+                <a:pPr/>
                 <a14:m>
                   <m:oMathPara xmlns:m="http://schemas.openxmlformats.org/officeDocument/2006/math">
                     <m:oMathParaPr>
@@ -8906,6 +9644,7 @@
                 <a:endParaRPr lang="en-US" altLang="zh-CN" sz="2000" b="0" dirty="0"/>
               </a:p>
               <a:p>
+                <a:pPr/>
                 <a14:m>
                   <m:oMathPara xmlns:m="http://schemas.openxmlformats.org/officeDocument/2006/math">
                     <m:oMathParaPr>
@@ -8994,7 +9733,7 @@
             </p:txBody>
           </p:sp>
         </mc:Choice>
-        <mc:Fallback>
+        <mc:Fallback xmlns="">
           <p:sp>
             <p:nvSpPr>
               <p:cNvPr id="8" name="文本框 7">
@@ -9018,7 +9757,7 @@
                 <a:avLst/>
               </a:prstGeom>
               <a:blipFill>
-                <a:blip r:embed="rId4"/>
+                <a:blip r:embed="rId5"/>
                 <a:stretch>
                   <a:fillRect/>
                 </a:stretch>
@@ -9039,8 +9778,8 @@
           </p:sp>
         </mc:Fallback>
       </mc:AlternateContent>
-      <mc:AlternateContent xmlns:mc="http://schemas.openxmlformats.org/markup-compatibility/2006">
-        <mc:Choice xmlns:a14="http://schemas.microsoft.com/office/drawing/2010/main" Requires="a14">
+      <mc:AlternateContent xmlns:mc="http://schemas.openxmlformats.org/markup-compatibility/2006" xmlns:a14="http://schemas.microsoft.com/office/drawing/2010/main">
+        <mc:Choice Requires="a14">
           <p:sp>
             <p:nvSpPr>
               <p:cNvPr id="9" name="文本框 8">
@@ -9069,6 +9808,7 @@
               </a:bodyPr>
               <a:lstStyle/>
               <a:p>
+                <a:pPr/>
                 <a14:m>
                   <m:oMathPara xmlns:m="http://schemas.openxmlformats.org/officeDocument/2006/math">
                     <m:oMathParaPr>
@@ -9534,7 +10274,7 @@
             </p:txBody>
           </p:sp>
         </mc:Choice>
-        <mc:Fallback>
+        <mc:Fallback xmlns="">
           <p:sp>
             <p:nvSpPr>
               <p:cNvPr id="9" name="文本框 8">
@@ -9558,9 +10298,606 @@
                 <a:avLst/>
               </a:prstGeom>
               <a:blipFill>
-                <a:blip r:embed="rId5"/>
+                <a:blip r:embed="rId6"/>
                 <a:stretch>
                   <a:fillRect b="-10870"/>
+                </a:stretch>
+              </a:blipFill>
+            </p:spPr>
+            <p:txBody>
+              <a:bodyPr/>
+              <a:lstStyle/>
+              <a:p>
+                <a:r>
+                  <a:rPr lang="zh-CN" altLang="en-US">
+                    <a:noFill/>
+                  </a:rPr>
+                  <a:t> </a:t>
+                </a:r>
+              </a:p>
+            </p:txBody>
+          </p:sp>
+        </mc:Fallback>
+      </mc:AlternateContent>
+      <mc:AlternateContent xmlns:mc="http://schemas.openxmlformats.org/markup-compatibility/2006">
+        <mc:Choice xmlns:a14="http://schemas.microsoft.com/office/drawing/2010/main" Requires="a14">
+          <p:sp>
+            <p:nvSpPr>
+              <p:cNvPr id="2" name="文本框 1">
+                <a:extLst>
+                  <a:ext uri="{FF2B5EF4-FFF2-40B4-BE49-F238E27FC236}">
+                    <a16:creationId xmlns:a16="http://schemas.microsoft.com/office/drawing/2014/main" id="{3EF2E49A-4C13-3AA3-35CC-DBE4827767FB}"/>
+                  </a:ext>
+                </a:extLst>
+              </p:cNvPr>
+              <p:cNvSpPr txBox="1"/>
+              <p:nvPr/>
+            </p:nvSpPr>
+            <p:spPr>
+              <a:xfrm>
+                <a:off x="2334827" y="6431136"/>
+                <a:ext cx="304058" cy="276999"/>
+              </a:xfrm>
+              <a:prstGeom prst="rect">
+                <a:avLst/>
+              </a:prstGeom>
+              <a:noFill/>
+            </p:spPr>
+            <p:txBody>
+              <a:bodyPr wrap="none" lIns="0" tIns="0" rIns="0" bIns="0" rtlCol="0">
+                <a:spAutoFit/>
+              </a:bodyPr>
+              <a:lstStyle/>
+              <a:p>
+                <a14:m>
+                  <m:oMathPara xmlns:m="http://schemas.openxmlformats.org/officeDocument/2006/math">
+                    <m:oMathParaPr>
+                      <m:jc m:val="centerGroup"/>
+                    </m:oMathParaPr>
+                    <m:oMath xmlns:m="http://schemas.openxmlformats.org/officeDocument/2006/math">
+                      <m:sSub>
+                        <m:sSubPr>
+                          <m:ctrlPr>
+                            <a:rPr lang="en-US" altLang="zh-CN" b="0" i="1" smtClean="0">
+                              <a:latin typeface="Cambria Math" panose="02040503050406030204" pitchFamily="18" charset="0"/>
+                            </a:rPr>
+                          </m:ctrlPr>
+                        </m:sSubPr>
+                        <m:e>
+                          <m:r>
+                            <a:rPr lang="en-US" altLang="zh-CN" b="0" i="1" smtClean="0">
+                              <a:latin typeface="Cambria Math" panose="02040503050406030204" pitchFamily="18" charset="0"/>
+                            </a:rPr>
+                            <m:t>𝐷</m:t>
+                          </m:r>
+                        </m:e>
+                        <m:sub>
+                          <m:r>
+                            <a:rPr lang="en-US" altLang="zh-CN" b="0" i="1" smtClean="0">
+                              <a:latin typeface="Cambria Math" panose="02040503050406030204" pitchFamily="18" charset="0"/>
+                            </a:rPr>
+                            <m:t>𝑠</m:t>
+                          </m:r>
+                        </m:sub>
+                      </m:sSub>
+                    </m:oMath>
+                  </m:oMathPara>
+                </a14:m>
+                <a:endParaRPr lang="zh-CN" altLang="en-US" dirty="0"/>
+              </a:p>
+            </p:txBody>
+          </p:sp>
+        </mc:Choice>
+        <mc:Fallback>
+          <p:sp>
+            <p:nvSpPr>
+              <p:cNvPr id="2" name="文本框 1">
+                <a:extLst>
+                  <a:ext uri="{FF2B5EF4-FFF2-40B4-BE49-F238E27FC236}">
+                    <a16:creationId xmlns:a16="http://schemas.microsoft.com/office/drawing/2014/main" id="{3EF2E49A-4C13-3AA3-35CC-DBE4827767FB}"/>
+                  </a:ext>
+                </a:extLst>
+              </p:cNvPr>
+              <p:cNvSpPr txBox="1">
+                <a:spLocks noRot="1" noChangeAspect="1" noMove="1" noResize="1" noEditPoints="1" noAdjustHandles="1" noChangeArrowheads="1" noChangeShapeType="1" noTextEdit="1"/>
+              </p:cNvSpPr>
+              <p:nvPr/>
+            </p:nvSpPr>
+            <p:spPr>
+              <a:xfrm>
+                <a:off x="2334827" y="6431136"/>
+                <a:ext cx="304058" cy="276999"/>
+              </a:xfrm>
+              <a:prstGeom prst="rect">
+                <a:avLst/>
+              </a:prstGeom>
+              <a:blipFill>
+                <a:blip r:embed="rId7"/>
+                <a:stretch>
+                  <a:fillRect l="-16000" r="-2000" b="-11111"/>
+                </a:stretch>
+              </a:blipFill>
+            </p:spPr>
+            <p:txBody>
+              <a:bodyPr/>
+              <a:lstStyle/>
+              <a:p>
+                <a:r>
+                  <a:rPr lang="zh-CN" altLang="en-US">
+                    <a:noFill/>
+                  </a:rPr>
+                  <a:t> </a:t>
+                </a:r>
+              </a:p>
+            </p:txBody>
+          </p:sp>
+        </mc:Fallback>
+      </mc:AlternateContent>
+      <p:sp>
+        <p:nvSpPr>
+          <p:cNvPr id="6" name="右大括号 5">
+            <a:extLst>
+              <a:ext uri="{FF2B5EF4-FFF2-40B4-BE49-F238E27FC236}">
+                <a16:creationId xmlns:a16="http://schemas.microsoft.com/office/drawing/2014/main" id="{C91E547D-0A10-2523-EC13-79932F79FC9D}"/>
+              </a:ext>
+            </a:extLst>
+          </p:cNvPr>
+          <p:cNvSpPr/>
+          <p:nvPr/>
+        </p:nvSpPr>
+        <p:spPr>
+          <a:xfrm rot="5400000">
+            <a:off x="2316481" y="5017639"/>
+            <a:ext cx="276997" cy="2547284"/>
+          </a:xfrm>
+          <a:prstGeom prst="rightBrace">
+            <a:avLst>
+              <a:gd name="adj1" fmla="val 78704"/>
+              <a:gd name="adj2" fmla="val 50000"/>
+            </a:avLst>
+          </a:prstGeom>
+        </p:spPr>
+        <p:style>
+          <a:lnRef idx="1">
+            <a:schemeClr val="accent1"/>
+          </a:lnRef>
+          <a:fillRef idx="0">
+            <a:schemeClr val="accent1"/>
+          </a:fillRef>
+          <a:effectRef idx="0">
+            <a:schemeClr val="accent1"/>
+          </a:effectRef>
+          <a:fontRef idx="minor">
+            <a:schemeClr val="tx1"/>
+          </a:fontRef>
+        </p:style>
+        <p:txBody>
+          <a:bodyPr rtlCol="0" anchor="ctr"/>
+          <a:lstStyle/>
+          <a:p>
+            <a:pPr algn="ctr"/>
+            <a:endParaRPr lang="zh-CN" altLang="en-US"/>
+          </a:p>
+        </p:txBody>
+      </p:sp>
+      <p:sp>
+        <p:nvSpPr>
+          <p:cNvPr id="10" name="右大括号 9">
+            <a:extLst>
+              <a:ext uri="{FF2B5EF4-FFF2-40B4-BE49-F238E27FC236}">
+                <a16:creationId xmlns:a16="http://schemas.microsoft.com/office/drawing/2014/main" id="{3C3136B3-58ED-34B0-5B10-EF543883737C}"/>
+              </a:ext>
+            </a:extLst>
+          </p:cNvPr>
+          <p:cNvSpPr/>
+          <p:nvPr/>
+        </p:nvSpPr>
+        <p:spPr>
+          <a:xfrm rot="5400000">
+            <a:off x="5584945" y="5049415"/>
+            <a:ext cx="276997" cy="2547284"/>
+          </a:xfrm>
+          <a:prstGeom prst="rightBrace">
+            <a:avLst>
+              <a:gd name="adj1" fmla="val 78704"/>
+              <a:gd name="adj2" fmla="val 50000"/>
+            </a:avLst>
+          </a:prstGeom>
+        </p:spPr>
+        <p:style>
+          <a:lnRef idx="1">
+            <a:schemeClr val="accent1"/>
+          </a:lnRef>
+          <a:fillRef idx="0">
+            <a:schemeClr val="accent1"/>
+          </a:fillRef>
+          <a:effectRef idx="0">
+            <a:schemeClr val="accent1"/>
+          </a:effectRef>
+          <a:fontRef idx="minor">
+            <a:schemeClr val="tx1"/>
+          </a:fontRef>
+        </p:style>
+        <p:txBody>
+          <a:bodyPr rtlCol="0" anchor="ctr"/>
+          <a:lstStyle/>
+          <a:p>
+            <a:pPr algn="ctr"/>
+            <a:endParaRPr lang="zh-CN" altLang="en-US"/>
+          </a:p>
+        </p:txBody>
+      </p:sp>
+      <mc:AlternateContent xmlns:mc="http://schemas.openxmlformats.org/markup-compatibility/2006">
+        <mc:Choice xmlns:a14="http://schemas.microsoft.com/office/drawing/2010/main" Requires="a14">
+          <p:sp>
+            <p:nvSpPr>
+              <p:cNvPr id="11" name="文本框 10">
+                <a:extLst>
+                  <a:ext uri="{FF2B5EF4-FFF2-40B4-BE49-F238E27FC236}">
+                    <a16:creationId xmlns:a16="http://schemas.microsoft.com/office/drawing/2014/main" id="{D6167957-BE6F-9F1D-674D-FF4348A6C5F7}"/>
+                  </a:ext>
+                </a:extLst>
+              </p:cNvPr>
+              <p:cNvSpPr txBox="1"/>
+              <p:nvPr/>
+            </p:nvSpPr>
+            <p:spPr>
+              <a:xfrm>
+                <a:off x="5571414" y="6431136"/>
+                <a:ext cx="387863" cy="276999"/>
+              </a:xfrm>
+              <a:prstGeom prst="rect">
+                <a:avLst/>
+              </a:prstGeom>
+              <a:noFill/>
+            </p:spPr>
+            <p:txBody>
+              <a:bodyPr wrap="none" lIns="0" tIns="0" rIns="0" bIns="0" rtlCol="0">
+                <a:spAutoFit/>
+              </a:bodyPr>
+              <a:lstStyle/>
+              <a:p>
+                <a14:m>
+                  <m:oMathPara xmlns:m="http://schemas.openxmlformats.org/officeDocument/2006/math">
+                    <m:oMathParaPr>
+                      <m:jc m:val="centerGroup"/>
+                    </m:oMathParaPr>
+                    <m:oMath xmlns:m="http://schemas.openxmlformats.org/officeDocument/2006/math">
+                      <m:sSub>
+                        <m:sSubPr>
+                          <m:ctrlPr>
+                            <a:rPr lang="en-US" altLang="zh-CN" b="0" i="1" smtClean="0">
+                              <a:latin typeface="Cambria Math" panose="02040503050406030204" pitchFamily="18" charset="0"/>
+                            </a:rPr>
+                          </m:ctrlPr>
+                        </m:sSubPr>
+                        <m:e>
+                          <m:r>
+                            <a:rPr lang="en-US" altLang="zh-CN" b="0" i="1" smtClean="0">
+                              <a:latin typeface="Cambria Math" panose="02040503050406030204" pitchFamily="18" charset="0"/>
+                            </a:rPr>
+                            <m:t>𝐷</m:t>
+                          </m:r>
+                        </m:e>
+                        <m:sub>
+                          <m:r>
+                            <a:rPr lang="en-US" altLang="zh-CN" b="0" i="1" smtClean="0">
+                              <a:latin typeface="Cambria Math" panose="02040503050406030204" pitchFamily="18" charset="0"/>
+                            </a:rPr>
+                            <m:t>𝑚</m:t>
+                          </m:r>
+                        </m:sub>
+                      </m:sSub>
+                    </m:oMath>
+                  </m:oMathPara>
+                </a14:m>
+                <a:endParaRPr lang="zh-CN" altLang="en-US" dirty="0"/>
+              </a:p>
+            </p:txBody>
+          </p:sp>
+        </mc:Choice>
+        <mc:Fallback>
+          <p:sp>
+            <p:nvSpPr>
+              <p:cNvPr id="11" name="文本框 10">
+                <a:extLst>
+                  <a:ext uri="{FF2B5EF4-FFF2-40B4-BE49-F238E27FC236}">
+                    <a16:creationId xmlns:a16="http://schemas.microsoft.com/office/drawing/2014/main" id="{D6167957-BE6F-9F1D-674D-FF4348A6C5F7}"/>
+                  </a:ext>
+                </a:extLst>
+              </p:cNvPr>
+              <p:cNvSpPr txBox="1">
+                <a:spLocks noRot="1" noChangeAspect="1" noMove="1" noResize="1" noEditPoints="1" noAdjustHandles="1" noChangeArrowheads="1" noChangeShapeType="1" noTextEdit="1"/>
+              </p:cNvSpPr>
+              <p:nvPr/>
+            </p:nvSpPr>
+            <p:spPr>
+              <a:xfrm>
+                <a:off x="5571414" y="6431136"/>
+                <a:ext cx="387863" cy="276999"/>
+              </a:xfrm>
+              <a:prstGeom prst="rect">
+                <a:avLst/>
+              </a:prstGeom>
+              <a:blipFill>
+                <a:blip r:embed="rId8"/>
+                <a:stretch>
+                  <a:fillRect l="-12500" b="-11111"/>
+                </a:stretch>
+              </a:blipFill>
+            </p:spPr>
+            <p:txBody>
+              <a:bodyPr/>
+              <a:lstStyle/>
+              <a:p>
+                <a:r>
+                  <a:rPr lang="zh-CN" altLang="en-US">
+                    <a:noFill/>
+                  </a:rPr>
+                  <a:t> </a:t>
+                </a:r>
+              </a:p>
+            </p:txBody>
+          </p:sp>
+        </mc:Fallback>
+      </mc:AlternateContent>
+      <mc:AlternateContent xmlns:mc="http://schemas.openxmlformats.org/markup-compatibility/2006">
+        <mc:Choice xmlns:a14="http://schemas.microsoft.com/office/drawing/2010/main" Requires="a14">
+          <p:sp>
+            <p:nvSpPr>
+              <p:cNvPr id="12" name="文本框 11">
+                <a:extLst>
+                  <a:ext uri="{FF2B5EF4-FFF2-40B4-BE49-F238E27FC236}">
+                    <a16:creationId xmlns:a16="http://schemas.microsoft.com/office/drawing/2014/main" id="{2956BF94-8886-9487-7634-165E08203185}"/>
+                  </a:ext>
+                </a:extLst>
+              </p:cNvPr>
+              <p:cNvSpPr txBox="1"/>
+              <p:nvPr/>
+            </p:nvSpPr>
+            <p:spPr>
+              <a:xfrm>
+                <a:off x="8607571" y="5538227"/>
+                <a:ext cx="1534651" cy="369332"/>
+              </a:xfrm>
+              <a:prstGeom prst="rect">
+                <a:avLst/>
+              </a:prstGeom>
+              <a:noFill/>
+            </p:spPr>
+            <p:txBody>
+              <a:bodyPr wrap="none" lIns="0" tIns="0" rIns="0" bIns="0" rtlCol="0">
+                <a:spAutoFit/>
+              </a:bodyPr>
+              <a:lstStyle/>
+              <a:p>
+                <a14:m>
+                  <m:oMathPara xmlns:m="http://schemas.openxmlformats.org/officeDocument/2006/math">
+                    <m:oMathParaPr>
+                      <m:jc m:val="centerGroup"/>
+                    </m:oMathParaPr>
+                    <m:oMath xmlns:m="http://schemas.openxmlformats.org/officeDocument/2006/math">
+                      <m:r>
+                        <a:rPr lang="en-US" altLang="zh-CN" sz="2400" b="0" i="1" smtClean="0">
+                          <a:latin typeface="Cambria Math" panose="02040503050406030204" pitchFamily="18" charset="0"/>
+                        </a:rPr>
+                        <m:t>𝐹</m:t>
+                      </m:r>
+                      <m:r>
+                        <a:rPr lang="en-US" altLang="zh-CN" sz="2400" b="0" i="1" smtClean="0">
+                          <a:latin typeface="Cambria Math" panose="02040503050406030204" pitchFamily="18" charset="0"/>
+                        </a:rPr>
+                        <m:t>=</m:t>
+                      </m:r>
+                      <m:sSub>
+                        <m:sSubPr>
+                          <m:ctrlPr>
+                            <a:rPr lang="en-US" altLang="zh-CN" sz="2400" b="0" i="1" smtClean="0">
+                              <a:latin typeface="Cambria Math" panose="02040503050406030204" pitchFamily="18" charset="0"/>
+                            </a:rPr>
+                          </m:ctrlPr>
+                        </m:sSubPr>
+                        <m:e>
+                          <m:r>
+                            <a:rPr lang="en-US" altLang="zh-CN" sz="2400" b="0" i="1" smtClean="0">
+                              <a:latin typeface="Cambria Math" panose="02040503050406030204" pitchFamily="18" charset="0"/>
+                            </a:rPr>
+                            <m:t>𝐷</m:t>
+                          </m:r>
+                        </m:e>
+                        <m:sub>
+                          <m:r>
+                            <a:rPr lang="en-US" altLang="zh-CN" sz="2400" b="0" i="1" smtClean="0">
+                              <a:latin typeface="Cambria Math" panose="02040503050406030204" pitchFamily="18" charset="0"/>
+                            </a:rPr>
+                            <m:t>𝑠</m:t>
+                          </m:r>
+                        </m:sub>
+                      </m:sSub>
+                      <m:sSubSup>
+                        <m:sSubSupPr>
+                          <m:ctrlPr>
+                            <a:rPr lang="en-US" altLang="zh-CN" sz="2400" b="0" i="1" smtClean="0">
+                              <a:latin typeface="Cambria Math" panose="02040503050406030204" pitchFamily="18" charset="0"/>
+                            </a:rPr>
+                          </m:ctrlPr>
+                        </m:sSubSupPr>
+                        <m:e>
+                          <m:r>
+                            <a:rPr lang="en-US" altLang="zh-CN" sz="2400" b="0" i="1" smtClean="0">
+                              <a:latin typeface="Cambria Math" panose="02040503050406030204" pitchFamily="18" charset="0"/>
+                            </a:rPr>
+                            <m:t>𝐷</m:t>
+                          </m:r>
+                        </m:e>
+                        <m:sub>
+                          <m:r>
+                            <a:rPr lang="en-US" altLang="zh-CN" sz="2400" b="0" i="1" smtClean="0">
+                              <a:latin typeface="Cambria Math" panose="02040503050406030204" pitchFamily="18" charset="0"/>
+                            </a:rPr>
+                            <m:t>𝑚</m:t>
+                          </m:r>
+                        </m:sub>
+                        <m:sup>
+                          <m:r>
+                            <a:rPr lang="en-US" altLang="zh-CN" sz="2400" b="0" i="1" smtClean="0">
+                              <a:latin typeface="Cambria Math" panose="02040503050406030204" pitchFamily="18" charset="0"/>
+                            </a:rPr>
+                            <m:t>−1</m:t>
+                          </m:r>
+                        </m:sup>
+                      </m:sSubSup>
+                    </m:oMath>
+                  </m:oMathPara>
+                </a14:m>
+                <a:endParaRPr lang="zh-CN" altLang="en-US" sz="2400" dirty="0"/>
+              </a:p>
+            </p:txBody>
+          </p:sp>
+        </mc:Choice>
+        <mc:Fallback>
+          <p:sp>
+            <p:nvSpPr>
+              <p:cNvPr id="12" name="文本框 11">
+                <a:extLst>
+                  <a:ext uri="{FF2B5EF4-FFF2-40B4-BE49-F238E27FC236}">
+                    <a16:creationId xmlns:a16="http://schemas.microsoft.com/office/drawing/2014/main" id="{2956BF94-8886-9487-7634-165E08203185}"/>
+                  </a:ext>
+                </a:extLst>
+              </p:cNvPr>
+              <p:cNvSpPr txBox="1">
+                <a:spLocks noRot="1" noChangeAspect="1" noMove="1" noResize="1" noEditPoints="1" noAdjustHandles="1" noChangeArrowheads="1" noChangeShapeType="1" noTextEdit="1"/>
+              </p:cNvSpPr>
+              <p:nvPr/>
+            </p:nvSpPr>
+            <p:spPr>
+              <a:xfrm>
+                <a:off x="8607571" y="5538227"/>
+                <a:ext cx="1534651" cy="369332"/>
+              </a:xfrm>
+              <a:prstGeom prst="rect">
+                <a:avLst/>
+              </a:prstGeom>
+              <a:blipFill>
+                <a:blip r:embed="rId9"/>
+                <a:stretch>
+                  <a:fillRect l="-3571" t="-1667" r="-794" b="-10000"/>
+                </a:stretch>
+              </a:blipFill>
+            </p:spPr>
+            <p:txBody>
+              <a:bodyPr/>
+              <a:lstStyle/>
+              <a:p>
+                <a:r>
+                  <a:rPr lang="zh-CN" altLang="en-US">
+                    <a:noFill/>
+                  </a:rPr>
+                  <a:t> </a:t>
+                </a:r>
+              </a:p>
+            </p:txBody>
+          </p:sp>
+        </mc:Fallback>
+      </mc:AlternateContent>
+      <mc:AlternateContent xmlns:mc="http://schemas.openxmlformats.org/markup-compatibility/2006">
+        <mc:Choice xmlns:a14="http://schemas.microsoft.com/office/drawing/2010/main" Requires="a14">
+          <p:sp>
+            <p:nvSpPr>
+              <p:cNvPr id="13" name="文本框 12">
+                <a:extLst>
+                  <a:ext uri="{FF2B5EF4-FFF2-40B4-BE49-F238E27FC236}">
+                    <a16:creationId xmlns:a16="http://schemas.microsoft.com/office/drawing/2014/main" id="{9A4346FE-E348-9C6B-D5A2-D5B9F7404963}"/>
+                  </a:ext>
+                </a:extLst>
+              </p:cNvPr>
+              <p:cNvSpPr txBox="1"/>
+              <p:nvPr/>
+            </p:nvSpPr>
+            <p:spPr>
+              <a:xfrm>
+                <a:off x="7892246" y="6070743"/>
+                <a:ext cx="2965299" cy="646331"/>
+              </a:xfrm>
+              <a:prstGeom prst="rect">
+                <a:avLst/>
+              </a:prstGeom>
+              <a:noFill/>
+            </p:spPr>
+            <p:txBody>
+              <a:bodyPr wrap="none" rtlCol="0">
+                <a:spAutoFit/>
+              </a:bodyPr>
+              <a:lstStyle/>
+              <a:p>
+                <a14:m>
+                  <m:oMath xmlns:m="http://schemas.openxmlformats.org/officeDocument/2006/math">
+                    <m:r>
+                      <a:rPr lang="en-US" altLang="zh-CN" b="0" i="1" smtClean="0">
+                        <a:latin typeface="Cambria Math" panose="02040503050406030204" pitchFamily="18" charset="0"/>
+                      </a:rPr>
+                      <m:t>𝐹</m:t>
+                    </m:r>
+                  </m:oMath>
+                </a14:m>
+                <a:r>
+                  <a:rPr lang="zh-CN" altLang="en-US" dirty="0"/>
+                  <a:t> </a:t>
+                </a:r>
+                <a:r>
+                  <a:rPr lang="en-US" altLang="zh-CN" dirty="0"/>
+                  <a:t>is related to deformation, </a:t>
+                </a:r>
+              </a:p>
+              <a:p>
+                <a:r>
+                  <a:rPr lang="en-US" altLang="zh-CN" dirty="0"/>
+                  <a:t>But it contains </a:t>
+                </a:r>
+                <a:r>
+                  <a:rPr lang="en-US" altLang="zh-CN" b="1" dirty="0">
+                    <a:solidFill>
+                      <a:srgbClr val="FF0000"/>
+                    </a:solidFill>
+                  </a:rPr>
+                  <a:t>rotation</a:t>
+                </a:r>
+                <a:r>
+                  <a:rPr lang="en-US" altLang="zh-CN" dirty="0"/>
+                  <a:t>.</a:t>
+                </a:r>
+                <a:endParaRPr lang="zh-CN" altLang="en-US" dirty="0"/>
+              </a:p>
+            </p:txBody>
+          </p:sp>
+        </mc:Choice>
+        <mc:Fallback>
+          <p:sp>
+            <p:nvSpPr>
+              <p:cNvPr id="13" name="文本框 12">
+                <a:extLst>
+                  <a:ext uri="{FF2B5EF4-FFF2-40B4-BE49-F238E27FC236}">
+                    <a16:creationId xmlns:a16="http://schemas.microsoft.com/office/drawing/2014/main" id="{9A4346FE-E348-9C6B-D5A2-D5B9F7404963}"/>
+                  </a:ext>
+                </a:extLst>
+              </p:cNvPr>
+              <p:cNvSpPr txBox="1">
+                <a:spLocks noRot="1" noChangeAspect="1" noMove="1" noResize="1" noEditPoints="1" noAdjustHandles="1" noChangeArrowheads="1" noChangeShapeType="1" noTextEdit="1"/>
+              </p:cNvSpPr>
+              <p:nvPr/>
+            </p:nvSpPr>
+            <p:spPr>
+              <a:xfrm>
+                <a:off x="7892246" y="6070743"/>
+                <a:ext cx="2965299" cy="646331"/>
+              </a:xfrm>
+              <a:prstGeom prst="rect">
+                <a:avLst/>
+              </a:prstGeom>
+              <a:blipFill>
+                <a:blip r:embed="rId10"/>
+                <a:stretch>
+                  <a:fillRect l="-1852" t="-5660" r="-617" b="-14151"/>
                 </a:stretch>
               </a:blipFill>
             </p:spPr>
@@ -9583,6 +10920,1516 @@
     <p:extLst>
       <p:ext uri="{BB962C8B-B14F-4D97-AF65-F5344CB8AC3E}">
         <p14:creationId xmlns:p14="http://schemas.microsoft.com/office/powerpoint/2010/main" val="647711035"/>
+      </p:ext>
+    </p:extLst>
+  </p:cSld>
+  <p:clrMapOvr>
+    <a:masterClrMapping/>
+  </p:clrMapOvr>
+</p:sld>
+</file>
+
+<file path=ppt/slides/slide15.xml><?xml version="1.0" encoding="utf-8"?>
+<p:sld xmlns:a="http://schemas.openxmlformats.org/drawingml/2006/main" xmlns:r="http://schemas.openxmlformats.org/officeDocument/2006/relationships" xmlns:p="http://schemas.openxmlformats.org/presentationml/2006/main">
+  <p:cSld>
+    <p:spTree>
+      <p:nvGrpSpPr>
+        <p:cNvPr id="1" name=""/>
+        <p:cNvGrpSpPr/>
+        <p:nvPr/>
+      </p:nvGrpSpPr>
+      <p:grpSpPr>
+        <a:xfrm>
+          <a:off x="0" y="0"/>
+          <a:ext cx="0" cy="0"/>
+          <a:chOff x="0" y="0"/>
+          <a:chExt cx="0" cy="0"/>
+        </a:xfrm>
+      </p:grpSpPr>
+      <p:sp>
+        <p:nvSpPr>
+          <p:cNvPr id="4" name="标题 1">
+            <a:extLst>
+              <a:ext uri="{FF2B5EF4-FFF2-40B4-BE49-F238E27FC236}">
+                <a16:creationId xmlns:a16="http://schemas.microsoft.com/office/drawing/2014/main" id="{2133513E-AC8C-4211-8D8D-85A9EF14DC79}"/>
+              </a:ext>
+            </a:extLst>
+          </p:cNvPr>
+          <p:cNvSpPr txBox="1">
+            <a:spLocks/>
+          </p:cNvSpPr>
+          <p:nvPr/>
+        </p:nvSpPr>
+        <p:spPr>
+          <a:xfrm>
+            <a:off x="990600" y="517525"/>
+            <a:ext cx="10515600" cy="1325563"/>
+          </a:xfrm>
+          <a:prstGeom prst="rect">
+            <a:avLst/>
+          </a:prstGeom>
+        </p:spPr>
+        <p:txBody>
+          <a:bodyPr vert="horz" lIns="91440" tIns="45720" rIns="91440" bIns="45720" rtlCol="0" anchor="ctr">
+            <a:normAutofit/>
+          </a:bodyPr>
+          <a:lstStyle>
+            <a:lvl1pPr algn="l" defTabSz="914400" rtl="0" eaLnBrk="1" latinLnBrk="0" hangingPunct="1">
+              <a:lnSpc>
+                <a:spcPct val="90000"/>
+              </a:lnSpc>
+              <a:spcBef>
+                <a:spcPct val="0"/>
+              </a:spcBef>
+              <a:buNone/>
+              <a:defRPr sz="4400" kern="1200">
+                <a:solidFill>
+                  <a:schemeClr val="tx1"/>
+                </a:solidFill>
+                <a:latin typeface="+mj-lt"/>
+                <a:ea typeface="+mj-ea"/>
+                <a:cs typeface="+mj-cs"/>
+              </a:defRPr>
+            </a:lvl1pPr>
+          </a:lstStyle>
+          <a:p>
+            <a:r>
+              <a:rPr lang="en-US" altLang="zh-CN" dirty="0">
+                <a:latin typeface="微软雅黑" panose="020B0503020204020204" pitchFamily="34" charset="-122"/>
+                <a:ea typeface="微软雅黑" panose="020B0503020204020204" pitchFamily="34" charset="-122"/>
+              </a:rPr>
+              <a:t>Linear finite element method (FEM)</a:t>
+            </a:r>
+            <a:endParaRPr lang="zh-CN" altLang="en-US" dirty="0">
+              <a:latin typeface="微软雅黑" panose="020B0503020204020204" pitchFamily="34" charset="-122"/>
+              <a:ea typeface="微软雅黑" panose="020B0503020204020204" pitchFamily="34" charset="-122"/>
+            </a:endParaRPr>
+          </a:p>
+        </p:txBody>
+      </p:sp>
+      <mc:AlternateContent xmlns:mc="http://schemas.openxmlformats.org/markup-compatibility/2006">
+        <mc:Choice xmlns:a14="http://schemas.microsoft.com/office/drawing/2010/main" Requires="a14">
+          <p:sp>
+            <p:nvSpPr>
+              <p:cNvPr id="5" name="内容占位符 2">
+                <a:extLst>
+                  <a:ext uri="{FF2B5EF4-FFF2-40B4-BE49-F238E27FC236}">
+                    <a16:creationId xmlns:a16="http://schemas.microsoft.com/office/drawing/2014/main" id="{0BEC3563-0F13-4A96-BBEA-B7D1F6A386B6}"/>
+                  </a:ext>
+                </a:extLst>
+              </p:cNvPr>
+              <p:cNvSpPr txBox="1">
+                <a:spLocks/>
+              </p:cNvSpPr>
+              <p:nvPr/>
+            </p:nvSpPr>
+            <p:spPr>
+              <a:xfrm>
+                <a:off x="990600" y="1978025"/>
+                <a:ext cx="10515600" cy="4351338"/>
+              </a:xfrm>
+              <a:prstGeom prst="rect">
+                <a:avLst/>
+              </a:prstGeom>
+            </p:spPr>
+            <p:txBody>
+              <a:bodyPr vert="horz" lIns="91440" tIns="45720" rIns="91440" bIns="45720" rtlCol="0">
+                <a:normAutofit/>
+              </a:bodyPr>
+              <a:lstStyle>
+                <a:lvl1pPr marL="228600" indent="-228600" algn="l" defTabSz="914400" rtl="0" eaLnBrk="1" latinLnBrk="0" hangingPunct="1">
+                  <a:lnSpc>
+                    <a:spcPct val="90000"/>
+                  </a:lnSpc>
+                  <a:spcBef>
+                    <a:spcPts val="1000"/>
+                  </a:spcBef>
+                  <a:buFont typeface="Arial" panose="020B0604020202020204" pitchFamily="34" charset="0"/>
+                  <a:buChar char="•"/>
+                  <a:defRPr sz="2800" kern="1200">
+                    <a:solidFill>
+                      <a:schemeClr val="tx1"/>
+                    </a:solidFill>
+                    <a:latin typeface="+mn-lt"/>
+                    <a:ea typeface="+mn-ea"/>
+                    <a:cs typeface="+mn-cs"/>
+                  </a:defRPr>
+                </a:lvl1pPr>
+                <a:lvl2pPr marL="685800" indent="-228600" algn="l" defTabSz="914400" rtl="0" eaLnBrk="1" latinLnBrk="0" hangingPunct="1">
+                  <a:lnSpc>
+                    <a:spcPct val="90000"/>
+                  </a:lnSpc>
+                  <a:spcBef>
+                    <a:spcPts val="500"/>
+                  </a:spcBef>
+                  <a:buFont typeface="Arial" panose="020B0604020202020204" pitchFamily="34" charset="0"/>
+                  <a:buChar char="•"/>
+                  <a:defRPr sz="2400" kern="1200">
+                    <a:solidFill>
+                      <a:schemeClr val="tx1"/>
+                    </a:solidFill>
+                    <a:latin typeface="+mn-lt"/>
+                    <a:ea typeface="+mn-ea"/>
+                    <a:cs typeface="+mn-cs"/>
+                  </a:defRPr>
+                </a:lvl2pPr>
+                <a:lvl3pPr marL="1143000" indent="-228600" algn="l" defTabSz="914400" rtl="0" eaLnBrk="1" latinLnBrk="0" hangingPunct="1">
+                  <a:lnSpc>
+                    <a:spcPct val="90000"/>
+                  </a:lnSpc>
+                  <a:spcBef>
+                    <a:spcPts val="500"/>
+                  </a:spcBef>
+                  <a:buFont typeface="Arial" panose="020B0604020202020204" pitchFamily="34" charset="0"/>
+                  <a:buChar char="•"/>
+                  <a:defRPr sz="2000" kern="1200">
+                    <a:solidFill>
+                      <a:schemeClr val="tx1"/>
+                    </a:solidFill>
+                    <a:latin typeface="+mn-lt"/>
+                    <a:ea typeface="+mn-ea"/>
+                    <a:cs typeface="+mn-cs"/>
+                  </a:defRPr>
+                </a:lvl3pPr>
+                <a:lvl4pPr marL="1600200" indent="-228600" algn="l" defTabSz="914400" rtl="0" eaLnBrk="1" latinLnBrk="0" hangingPunct="1">
+                  <a:lnSpc>
+                    <a:spcPct val="90000"/>
+                  </a:lnSpc>
+                  <a:spcBef>
+                    <a:spcPts val="500"/>
+                  </a:spcBef>
+                  <a:buFont typeface="Arial" panose="020B0604020202020204" pitchFamily="34" charset="0"/>
+                  <a:buChar char="•"/>
+                  <a:defRPr sz="1800" kern="1200">
+                    <a:solidFill>
+                      <a:schemeClr val="tx1"/>
+                    </a:solidFill>
+                    <a:latin typeface="+mn-lt"/>
+                    <a:ea typeface="+mn-ea"/>
+                    <a:cs typeface="+mn-cs"/>
+                  </a:defRPr>
+                </a:lvl4pPr>
+                <a:lvl5pPr marL="2057400" indent="-228600" algn="l" defTabSz="914400" rtl="0" eaLnBrk="1" latinLnBrk="0" hangingPunct="1">
+                  <a:lnSpc>
+                    <a:spcPct val="90000"/>
+                  </a:lnSpc>
+                  <a:spcBef>
+                    <a:spcPts val="500"/>
+                  </a:spcBef>
+                  <a:buFont typeface="Arial" panose="020B0604020202020204" pitchFamily="34" charset="0"/>
+                  <a:buChar char="•"/>
+                  <a:defRPr sz="1800" kern="1200">
+                    <a:solidFill>
+                      <a:schemeClr val="tx1"/>
+                    </a:solidFill>
+                    <a:latin typeface="+mn-lt"/>
+                    <a:ea typeface="+mn-ea"/>
+                    <a:cs typeface="+mn-cs"/>
+                  </a:defRPr>
+                </a:lvl5pPr>
+                <a:lvl6pPr marL="2514600" indent="-228600" algn="l" defTabSz="914400" rtl="0" eaLnBrk="1" latinLnBrk="0" hangingPunct="1">
+                  <a:lnSpc>
+                    <a:spcPct val="90000"/>
+                  </a:lnSpc>
+                  <a:spcBef>
+                    <a:spcPts val="500"/>
+                  </a:spcBef>
+                  <a:buFont typeface="Arial" panose="020B0604020202020204" pitchFamily="34" charset="0"/>
+                  <a:buChar char="•"/>
+                  <a:defRPr sz="1800" kern="1200">
+                    <a:solidFill>
+                      <a:schemeClr val="tx1"/>
+                    </a:solidFill>
+                    <a:latin typeface="+mn-lt"/>
+                    <a:ea typeface="+mn-ea"/>
+                    <a:cs typeface="+mn-cs"/>
+                  </a:defRPr>
+                </a:lvl6pPr>
+                <a:lvl7pPr marL="2971800" indent="-228600" algn="l" defTabSz="914400" rtl="0" eaLnBrk="1" latinLnBrk="0" hangingPunct="1">
+                  <a:lnSpc>
+                    <a:spcPct val="90000"/>
+                  </a:lnSpc>
+                  <a:spcBef>
+                    <a:spcPts val="500"/>
+                  </a:spcBef>
+                  <a:buFont typeface="Arial" panose="020B0604020202020204" pitchFamily="34" charset="0"/>
+                  <a:buChar char="•"/>
+                  <a:defRPr sz="1800" kern="1200">
+                    <a:solidFill>
+                      <a:schemeClr val="tx1"/>
+                    </a:solidFill>
+                    <a:latin typeface="+mn-lt"/>
+                    <a:ea typeface="+mn-ea"/>
+                    <a:cs typeface="+mn-cs"/>
+                  </a:defRPr>
+                </a:lvl7pPr>
+                <a:lvl8pPr marL="3429000" indent="-228600" algn="l" defTabSz="914400" rtl="0" eaLnBrk="1" latinLnBrk="0" hangingPunct="1">
+                  <a:lnSpc>
+                    <a:spcPct val="90000"/>
+                  </a:lnSpc>
+                  <a:spcBef>
+                    <a:spcPts val="500"/>
+                  </a:spcBef>
+                  <a:buFont typeface="Arial" panose="020B0604020202020204" pitchFamily="34" charset="0"/>
+                  <a:buChar char="•"/>
+                  <a:defRPr sz="1800" kern="1200">
+                    <a:solidFill>
+                      <a:schemeClr val="tx1"/>
+                    </a:solidFill>
+                    <a:latin typeface="+mn-lt"/>
+                    <a:ea typeface="+mn-ea"/>
+                    <a:cs typeface="+mn-cs"/>
+                  </a:defRPr>
+                </a:lvl8pPr>
+                <a:lvl9pPr marL="3886200" indent="-228600" algn="l" defTabSz="914400" rtl="0" eaLnBrk="1" latinLnBrk="0" hangingPunct="1">
+                  <a:lnSpc>
+                    <a:spcPct val="90000"/>
+                  </a:lnSpc>
+                  <a:spcBef>
+                    <a:spcPts val="500"/>
+                  </a:spcBef>
+                  <a:buFont typeface="Arial" panose="020B0604020202020204" pitchFamily="34" charset="0"/>
+                  <a:buChar char="•"/>
+                  <a:defRPr sz="1800" kern="1200">
+                    <a:solidFill>
+                      <a:schemeClr val="tx1"/>
+                    </a:solidFill>
+                    <a:latin typeface="+mn-lt"/>
+                    <a:ea typeface="+mn-ea"/>
+                    <a:cs typeface="+mn-cs"/>
+                  </a:defRPr>
+                </a:lvl9pPr>
+              </a:lstStyle>
+              <a:p>
+                <a:pPr marL="0" indent="0">
+                  <a:buNone/>
+                </a:pPr>
+                <a:r>
+                  <a:rPr lang="en-US" altLang="zh-CN" sz="2400" dirty="0"/>
+                  <a:t>Ideally, we need a tensor to describe shape deformation only. Recall that SVD gives </a:t>
+                </a:r>
+                <a14:m>
+                  <m:oMath xmlns:m="http://schemas.openxmlformats.org/officeDocument/2006/math">
+                    <m:r>
+                      <a:rPr lang="en-US" altLang="zh-CN" sz="2400" b="0" i="1" smtClean="0">
+                        <a:latin typeface="Cambria Math" panose="02040503050406030204" pitchFamily="18" charset="0"/>
+                      </a:rPr>
+                      <m:t>𝐹</m:t>
+                    </m:r>
+                    <m:r>
+                      <a:rPr lang="en-US" altLang="zh-CN" sz="2400" b="0" i="1" smtClean="0">
+                        <a:latin typeface="Cambria Math" panose="02040503050406030204" pitchFamily="18" charset="0"/>
+                      </a:rPr>
+                      <m:t>=</m:t>
+                    </m:r>
+                    <m:r>
+                      <a:rPr lang="en-US" altLang="zh-CN" sz="2400" b="0" i="1" smtClean="0">
+                        <a:latin typeface="Cambria Math" panose="02040503050406030204" pitchFamily="18" charset="0"/>
+                      </a:rPr>
+                      <m:t>𝑈𝐷</m:t>
+                    </m:r>
+                    <m:sSup>
+                      <m:sSupPr>
+                        <m:ctrlPr>
+                          <a:rPr lang="en-US" altLang="zh-CN" sz="2400" b="0" i="1" smtClean="0">
+                            <a:latin typeface="Cambria Math" panose="02040503050406030204" pitchFamily="18" charset="0"/>
+                          </a:rPr>
+                        </m:ctrlPr>
+                      </m:sSupPr>
+                      <m:e>
+                        <m:r>
+                          <a:rPr lang="en-US" altLang="zh-CN" sz="2400" b="0" i="1" smtClean="0">
+                            <a:latin typeface="Cambria Math" panose="02040503050406030204" pitchFamily="18" charset="0"/>
+                          </a:rPr>
+                          <m:t>𝑉</m:t>
+                        </m:r>
+                      </m:e>
+                      <m:sup>
+                        <m:r>
+                          <a:rPr lang="en-US" altLang="zh-CN" sz="2400" b="0" i="1" smtClean="0">
+                            <a:latin typeface="Cambria Math" panose="02040503050406030204" pitchFamily="18" charset="0"/>
+                          </a:rPr>
+                          <m:t>𝑇</m:t>
+                        </m:r>
+                      </m:sup>
+                    </m:sSup>
+                  </m:oMath>
+                </a14:m>
+                <a:r>
+                  <a:rPr lang="en-US" altLang="zh-CN" sz="2400" dirty="0"/>
+                  <a:t>, where only </a:t>
+                </a:r>
+                <a14:m>
+                  <m:oMath xmlns:m="http://schemas.openxmlformats.org/officeDocument/2006/math">
+                    <m:sSup>
+                      <m:sSupPr>
+                        <m:ctrlPr>
+                          <a:rPr lang="en-US" altLang="zh-CN" sz="2400" i="1">
+                            <a:latin typeface="Cambria Math" panose="02040503050406030204" pitchFamily="18" charset="0"/>
+                          </a:rPr>
+                        </m:ctrlPr>
+                      </m:sSupPr>
+                      <m:e>
+                        <m:r>
+                          <a:rPr lang="en-US" altLang="zh-CN" sz="2400" i="1">
+                            <a:latin typeface="Cambria Math" panose="02040503050406030204" pitchFamily="18" charset="0"/>
+                          </a:rPr>
+                          <m:t>𝑉</m:t>
+                        </m:r>
+                      </m:e>
+                      <m:sup>
+                        <m:r>
+                          <a:rPr lang="en-US" altLang="zh-CN" sz="2400" i="1">
+                            <a:latin typeface="Cambria Math" panose="02040503050406030204" pitchFamily="18" charset="0"/>
+                          </a:rPr>
+                          <m:t>𝑇</m:t>
+                        </m:r>
+                      </m:sup>
+                    </m:sSup>
+                  </m:oMath>
+                </a14:m>
+                <a:r>
+                  <a:rPr lang="en-US" altLang="zh-CN" sz="2400" dirty="0"/>
+                  <a:t> and </a:t>
+                </a:r>
+                <a14:m>
+                  <m:oMath xmlns:m="http://schemas.openxmlformats.org/officeDocument/2006/math">
+                    <m:r>
+                      <a:rPr lang="en-US" altLang="zh-CN" sz="2400" i="1">
+                        <a:latin typeface="Cambria Math" panose="02040503050406030204" pitchFamily="18" charset="0"/>
+                      </a:rPr>
+                      <m:t>𝐷</m:t>
+                    </m:r>
+                  </m:oMath>
+                </a14:m>
+                <a:r>
+                  <a:rPr lang="en-US" altLang="zh-CN" sz="2400" dirty="0"/>
+                  <a:t> are relevant to deformation.</a:t>
+                </a:r>
+              </a:p>
+              <a:p>
+                <a:pPr marL="0" indent="0">
+                  <a:buNone/>
+                </a:pPr>
+                <a:endParaRPr lang="en-US" altLang="zh-CN" sz="2400" dirty="0"/>
+              </a:p>
+              <a:p>
+                <a:pPr marL="0" indent="0">
+                  <a:buNone/>
+                </a:pPr>
+                <a:endParaRPr lang="en-US" altLang="zh-CN" sz="2400" dirty="0"/>
+              </a:p>
+              <a:p>
+                <a:pPr marL="0" indent="0">
+                  <a:buNone/>
+                </a:pPr>
+                <a:endParaRPr lang="en-US" altLang="zh-CN" sz="2400" dirty="0"/>
+              </a:p>
+              <a:p>
+                <a:pPr marL="0" indent="0">
+                  <a:buNone/>
+                </a:pPr>
+                <a:r>
+                  <a:rPr lang="en-US" altLang="zh-CN" sz="2400" dirty="0"/>
+                  <a:t>So we get rid of </a:t>
+                </a:r>
+                <a14:m>
+                  <m:oMath xmlns:m="http://schemas.openxmlformats.org/officeDocument/2006/math">
+                    <m:r>
+                      <a:rPr lang="en-US" altLang="zh-CN" sz="2400" b="0" i="1" smtClean="0">
+                        <a:latin typeface="Cambria Math" panose="02040503050406030204" pitchFamily="18" charset="0"/>
+                      </a:rPr>
+                      <m:t>𝑈</m:t>
+                    </m:r>
+                  </m:oMath>
+                </a14:m>
+                <a:r>
+                  <a:rPr lang="en-US" altLang="zh-CN" sz="2400" dirty="0"/>
+                  <a:t> as: </a:t>
+                </a:r>
+              </a:p>
+              <a:p>
+                <a:pPr marL="0" indent="0">
+                  <a:buNone/>
+                </a:pPr>
+                <a14:m>
+                  <m:oMathPara xmlns:m="http://schemas.openxmlformats.org/officeDocument/2006/math">
+                    <m:oMathParaPr>
+                      <m:jc m:val="centerGroup"/>
+                    </m:oMathParaPr>
+                    <m:oMath xmlns:m="http://schemas.openxmlformats.org/officeDocument/2006/math">
+                      <m:sSub>
+                        <m:sSubPr>
+                          <m:ctrlPr>
+                            <a:rPr lang="en-US" altLang="zh-CN" sz="2400" b="0" i="1" smtClean="0">
+                              <a:latin typeface="Cambria Math" panose="02040503050406030204" pitchFamily="18" charset="0"/>
+                            </a:rPr>
+                          </m:ctrlPr>
+                        </m:sSubPr>
+                        <m:e>
+                          <m:r>
+                            <a:rPr lang="en-US" altLang="zh-CN" sz="2400" b="0" i="1" smtClean="0">
+                              <a:latin typeface="Cambria Math" panose="02040503050406030204" pitchFamily="18" charset="0"/>
+                            </a:rPr>
+                            <m:t>𝜖</m:t>
+                          </m:r>
+                        </m:e>
+                        <m:sub>
+                          <m:r>
+                            <a:rPr lang="en-US" altLang="zh-CN" sz="2400" b="0" i="1" smtClean="0">
+                              <a:latin typeface="Cambria Math" panose="02040503050406030204" pitchFamily="18" charset="0"/>
+                            </a:rPr>
+                            <m:t>𝐺</m:t>
+                          </m:r>
+                        </m:sub>
+                      </m:sSub>
+                      <m:r>
+                        <a:rPr lang="en-US" altLang="zh-CN" sz="2400" b="0" i="1" smtClean="0">
+                          <a:latin typeface="Cambria Math" panose="02040503050406030204" pitchFamily="18" charset="0"/>
+                        </a:rPr>
+                        <m:t>(</m:t>
+                      </m:r>
+                      <m:r>
+                        <a:rPr lang="en-US" altLang="zh-CN" sz="2400" b="0" i="1" smtClean="0">
+                          <a:latin typeface="Cambria Math" panose="02040503050406030204" pitchFamily="18" charset="0"/>
+                        </a:rPr>
+                        <m:t>𝐹</m:t>
+                      </m:r>
+                      <m:r>
+                        <a:rPr lang="en-US" altLang="zh-CN" sz="2400" b="0" i="1" smtClean="0">
+                          <a:latin typeface="Cambria Math" panose="02040503050406030204" pitchFamily="18" charset="0"/>
+                        </a:rPr>
+                        <m:t>)=</m:t>
+                      </m:r>
+                      <m:f>
+                        <m:fPr>
+                          <m:ctrlPr>
+                            <a:rPr lang="en-US" altLang="zh-CN" sz="2400" b="0" i="1" smtClean="0">
+                              <a:latin typeface="Cambria Math" panose="02040503050406030204" pitchFamily="18" charset="0"/>
+                            </a:rPr>
+                          </m:ctrlPr>
+                        </m:fPr>
+                        <m:num>
+                          <m:r>
+                            <a:rPr lang="en-US" altLang="zh-CN" sz="2400" b="0" i="1" smtClean="0">
+                              <a:latin typeface="Cambria Math" panose="02040503050406030204" pitchFamily="18" charset="0"/>
+                            </a:rPr>
+                            <m:t>1</m:t>
+                          </m:r>
+                        </m:num>
+                        <m:den>
+                          <m:r>
+                            <a:rPr lang="en-US" altLang="zh-CN" sz="2400" b="0" i="1" smtClean="0">
+                              <a:latin typeface="Cambria Math" panose="02040503050406030204" pitchFamily="18" charset="0"/>
+                            </a:rPr>
+                            <m:t>2</m:t>
+                          </m:r>
+                        </m:den>
+                      </m:f>
+                      <m:d>
+                        <m:dPr>
+                          <m:ctrlPr>
+                            <a:rPr lang="en-US" altLang="zh-CN" sz="2400" b="0" i="1" smtClean="0">
+                              <a:latin typeface="Cambria Math" panose="02040503050406030204" pitchFamily="18" charset="0"/>
+                            </a:rPr>
+                          </m:ctrlPr>
+                        </m:dPr>
+                        <m:e>
+                          <m:sSup>
+                            <m:sSupPr>
+                              <m:ctrlPr>
+                                <a:rPr lang="en-US" altLang="zh-CN" sz="2400" b="0" i="1" smtClean="0">
+                                  <a:latin typeface="Cambria Math" panose="02040503050406030204" pitchFamily="18" charset="0"/>
+                                </a:rPr>
+                              </m:ctrlPr>
+                            </m:sSupPr>
+                            <m:e>
+                              <m:r>
+                                <a:rPr lang="en-US" altLang="zh-CN" sz="2400" b="0" i="1" smtClean="0">
+                                  <a:latin typeface="Cambria Math" panose="02040503050406030204" pitchFamily="18" charset="0"/>
+                                </a:rPr>
+                                <m:t>𝐹</m:t>
+                              </m:r>
+                            </m:e>
+                            <m:sup>
+                              <m:r>
+                                <a:rPr lang="en-US" altLang="zh-CN" sz="2400" b="0" i="1" smtClean="0">
+                                  <a:latin typeface="Cambria Math" panose="02040503050406030204" pitchFamily="18" charset="0"/>
+                                </a:rPr>
+                                <m:t>𝑇</m:t>
+                              </m:r>
+                            </m:sup>
+                          </m:sSup>
+                          <m:r>
+                            <a:rPr lang="en-US" altLang="zh-CN" sz="2400" b="0" i="1" smtClean="0">
+                              <a:latin typeface="Cambria Math" panose="02040503050406030204" pitchFamily="18" charset="0"/>
+                            </a:rPr>
+                            <m:t>𝐹</m:t>
+                          </m:r>
+                          <m:r>
+                            <a:rPr lang="en-US" altLang="zh-CN" sz="2400" b="0" i="1" smtClean="0">
+                              <a:latin typeface="Cambria Math" panose="02040503050406030204" pitchFamily="18" charset="0"/>
+                            </a:rPr>
+                            <m:t>−</m:t>
+                          </m:r>
+                          <m:r>
+                            <a:rPr lang="en-US" altLang="zh-CN" sz="2400" b="0" i="1" smtClean="0">
+                              <a:latin typeface="Cambria Math" panose="02040503050406030204" pitchFamily="18" charset="0"/>
+                            </a:rPr>
+                            <m:t>𝐼</m:t>
+                          </m:r>
+                        </m:e>
+                      </m:d>
+                      <m:r>
+                        <a:rPr lang="en-US" altLang="zh-CN" sz="2400" b="0" i="1" smtClean="0">
+                          <a:latin typeface="Cambria Math" panose="02040503050406030204" pitchFamily="18" charset="0"/>
+                        </a:rPr>
+                        <m:t>=</m:t>
+                      </m:r>
+                      <m:f>
+                        <m:fPr>
+                          <m:ctrlPr>
+                            <a:rPr lang="en-US" altLang="zh-CN" sz="2400" b="0" i="1" smtClean="0">
+                              <a:latin typeface="Cambria Math" panose="02040503050406030204" pitchFamily="18" charset="0"/>
+                            </a:rPr>
+                          </m:ctrlPr>
+                        </m:fPr>
+                        <m:num>
+                          <m:r>
+                            <a:rPr lang="en-US" altLang="zh-CN" sz="2400" b="0" i="1" smtClean="0">
+                              <a:latin typeface="Cambria Math" panose="02040503050406030204" pitchFamily="18" charset="0"/>
+                            </a:rPr>
+                            <m:t>1</m:t>
+                          </m:r>
+                        </m:num>
+                        <m:den>
+                          <m:r>
+                            <a:rPr lang="en-US" altLang="zh-CN" sz="2400" b="0" i="1" smtClean="0">
+                              <a:latin typeface="Cambria Math" panose="02040503050406030204" pitchFamily="18" charset="0"/>
+                            </a:rPr>
+                            <m:t>2</m:t>
+                          </m:r>
+                        </m:den>
+                      </m:f>
+                      <m:r>
+                        <a:rPr lang="en-US" altLang="zh-CN" sz="2400" b="0" i="1" smtClean="0">
+                          <a:latin typeface="Cambria Math" panose="02040503050406030204" pitchFamily="18" charset="0"/>
+                        </a:rPr>
+                        <m:t>(</m:t>
+                      </m:r>
+                      <m:r>
+                        <a:rPr lang="en-US" altLang="zh-CN" sz="2400" b="0" i="1" smtClean="0">
+                          <a:latin typeface="Cambria Math" panose="02040503050406030204" pitchFamily="18" charset="0"/>
+                        </a:rPr>
+                        <m:t>𝑉</m:t>
+                      </m:r>
+                      <m:sSup>
+                        <m:sSupPr>
+                          <m:ctrlPr>
+                            <a:rPr lang="en-US" altLang="zh-CN" sz="2400" b="0" i="1" smtClean="0">
+                              <a:latin typeface="Cambria Math" panose="02040503050406030204" pitchFamily="18" charset="0"/>
+                            </a:rPr>
+                          </m:ctrlPr>
+                        </m:sSupPr>
+                        <m:e>
+                          <m:r>
+                            <a:rPr lang="en-US" altLang="zh-CN" sz="2400" b="0" i="1" smtClean="0">
+                              <a:latin typeface="Cambria Math" panose="02040503050406030204" pitchFamily="18" charset="0"/>
+                            </a:rPr>
+                            <m:t>𝐷</m:t>
+                          </m:r>
+                        </m:e>
+                        <m:sup>
+                          <m:r>
+                            <a:rPr lang="en-US" altLang="zh-CN" sz="2400" b="0" i="1" smtClean="0">
+                              <a:latin typeface="Cambria Math" panose="02040503050406030204" pitchFamily="18" charset="0"/>
+                            </a:rPr>
+                            <m:t>2</m:t>
+                          </m:r>
+                        </m:sup>
+                      </m:sSup>
+                      <m:sSup>
+                        <m:sSupPr>
+                          <m:ctrlPr>
+                            <a:rPr lang="en-US" altLang="zh-CN" sz="2400" b="0" i="1" smtClean="0">
+                              <a:latin typeface="Cambria Math" panose="02040503050406030204" pitchFamily="18" charset="0"/>
+                            </a:rPr>
+                          </m:ctrlPr>
+                        </m:sSupPr>
+                        <m:e>
+                          <m:r>
+                            <a:rPr lang="en-US" altLang="zh-CN" sz="2400" b="0" i="1" smtClean="0">
+                              <a:latin typeface="Cambria Math" panose="02040503050406030204" pitchFamily="18" charset="0"/>
+                            </a:rPr>
+                            <m:t>𝑉</m:t>
+                          </m:r>
+                        </m:e>
+                        <m:sup>
+                          <m:r>
+                            <a:rPr lang="en-US" altLang="zh-CN" sz="2400" b="0" i="1" smtClean="0">
+                              <a:latin typeface="Cambria Math" panose="02040503050406030204" pitchFamily="18" charset="0"/>
+                            </a:rPr>
+                            <m:t>𝑇</m:t>
+                          </m:r>
+                        </m:sup>
+                      </m:sSup>
+                      <m:r>
+                        <a:rPr lang="en-US" altLang="zh-CN" sz="2400" b="0" i="1" smtClean="0">
+                          <a:latin typeface="Cambria Math" panose="02040503050406030204" pitchFamily="18" charset="0"/>
+                        </a:rPr>
+                        <m:t>−</m:t>
+                      </m:r>
+                      <m:r>
+                        <a:rPr lang="en-US" altLang="zh-CN" sz="2400" b="0" i="1" smtClean="0">
+                          <a:latin typeface="Cambria Math" panose="02040503050406030204" pitchFamily="18" charset="0"/>
+                        </a:rPr>
+                        <m:t>𝐼</m:t>
+                      </m:r>
+                      <m:r>
+                        <a:rPr lang="en-US" altLang="zh-CN" sz="2400" b="0" i="1" smtClean="0">
+                          <a:latin typeface="Cambria Math" panose="02040503050406030204" pitchFamily="18" charset="0"/>
+                        </a:rPr>
+                        <m:t>)</m:t>
+                      </m:r>
+                    </m:oMath>
+                  </m:oMathPara>
+                </a14:m>
+                <a:endParaRPr lang="en-US" altLang="zh-CN" sz="2400" dirty="0"/>
+              </a:p>
+              <a:p>
+                <a:pPr marL="0" indent="0">
+                  <a:buNone/>
+                </a:pPr>
+                <a:r>
+                  <a:rPr lang="en-US" altLang="zh-CN" sz="2400" dirty="0"/>
+                  <a:t>Strain:  Descriptor of severity of deformation</a:t>
+                </a:r>
+              </a:p>
+              <a:p>
+                <a:pPr lvl="1"/>
+                <a14:m>
+                  <m:oMath xmlns:m="http://schemas.openxmlformats.org/officeDocument/2006/math">
+                    <m:r>
+                      <a:rPr lang="en-US" altLang="zh-CN" sz="2000" b="0" i="1" smtClean="0">
+                        <a:latin typeface="Cambria Math" panose="02040503050406030204" pitchFamily="18" charset="0"/>
+                      </a:rPr>
+                      <m:t>𝜖</m:t>
+                    </m:r>
+                    <m:d>
+                      <m:dPr>
+                        <m:ctrlPr>
+                          <a:rPr lang="en-US" altLang="zh-CN" sz="2000" b="0" i="1" smtClean="0">
+                            <a:latin typeface="Cambria Math" panose="02040503050406030204" pitchFamily="18" charset="0"/>
+                          </a:rPr>
+                        </m:ctrlPr>
+                      </m:dPr>
+                      <m:e>
+                        <m:r>
+                          <a:rPr lang="en-US" altLang="zh-CN" sz="2000" b="0" i="1" smtClean="0">
+                            <a:latin typeface="Cambria Math" panose="02040503050406030204" pitchFamily="18" charset="0"/>
+                          </a:rPr>
+                          <m:t>𝐼</m:t>
+                        </m:r>
+                      </m:e>
+                    </m:d>
+                    <m:r>
+                      <a:rPr lang="en-US" altLang="zh-CN" sz="2000" b="0" i="1" smtClean="0">
+                        <a:latin typeface="Cambria Math" panose="02040503050406030204" pitchFamily="18" charset="0"/>
+                      </a:rPr>
+                      <m:t>=0</m:t>
+                    </m:r>
+                  </m:oMath>
+                </a14:m>
+                <a:endParaRPr lang="en-US" altLang="zh-CN" sz="2000" b="0" dirty="0"/>
+              </a:p>
+              <a:p>
+                <a:pPr lvl="1"/>
+                <a14:m>
+                  <m:oMath xmlns:m="http://schemas.openxmlformats.org/officeDocument/2006/math">
+                    <m:r>
+                      <a:rPr lang="en-US" altLang="zh-CN" sz="2000" b="0" i="1" smtClean="0">
+                        <a:latin typeface="Cambria Math" panose="02040503050406030204" pitchFamily="18" charset="0"/>
+                      </a:rPr>
+                      <m:t>𝜖</m:t>
+                    </m:r>
+                    <m:d>
+                      <m:dPr>
+                        <m:ctrlPr>
+                          <a:rPr lang="en-US" altLang="zh-CN" sz="2000" b="0" i="1" smtClean="0">
+                            <a:latin typeface="Cambria Math" panose="02040503050406030204" pitchFamily="18" charset="0"/>
+                          </a:rPr>
+                        </m:ctrlPr>
+                      </m:dPr>
+                      <m:e>
+                        <m:r>
+                          <a:rPr lang="en-US" altLang="zh-CN" sz="2000" b="0" i="1" smtClean="0">
+                            <a:latin typeface="Cambria Math" panose="02040503050406030204" pitchFamily="18" charset="0"/>
+                          </a:rPr>
+                          <m:t>𝐹</m:t>
+                        </m:r>
+                      </m:e>
+                    </m:d>
+                    <m:r>
+                      <a:rPr lang="en-US" altLang="zh-CN" sz="2000" b="0" i="1" smtClean="0">
+                        <a:latin typeface="Cambria Math" panose="02040503050406030204" pitchFamily="18" charset="0"/>
+                      </a:rPr>
+                      <m:t>=</m:t>
+                    </m:r>
+                    <m:r>
+                      <a:rPr lang="en-US" altLang="zh-CN" sz="2000" b="0" i="1" smtClean="0">
+                        <a:latin typeface="Cambria Math" panose="02040503050406030204" pitchFamily="18" charset="0"/>
+                      </a:rPr>
+                      <m:t>𝜖</m:t>
+                    </m:r>
+                    <m:r>
+                      <a:rPr lang="en-US" altLang="zh-CN" sz="2000" b="0" i="1" smtClean="0">
+                        <a:latin typeface="Cambria Math" panose="02040503050406030204" pitchFamily="18" charset="0"/>
+                      </a:rPr>
+                      <m:t>(</m:t>
+                    </m:r>
+                    <m:r>
+                      <a:rPr lang="en-US" altLang="zh-CN" sz="2000" b="0" i="1" smtClean="0">
+                        <a:latin typeface="Cambria Math" panose="02040503050406030204" pitchFamily="18" charset="0"/>
+                      </a:rPr>
+                      <m:t>𝑅𝐹</m:t>
+                    </m:r>
+                    <m:r>
+                      <a:rPr lang="en-US" altLang="zh-CN" sz="2000" b="0" i="1" smtClean="0">
+                        <a:latin typeface="Cambria Math" panose="02040503050406030204" pitchFamily="18" charset="0"/>
+                      </a:rPr>
+                      <m:t>)</m:t>
+                    </m:r>
+                  </m:oMath>
+                </a14:m>
+                <a:endParaRPr lang="en-US" altLang="zh-CN" sz="2000" dirty="0"/>
+              </a:p>
+            </p:txBody>
+          </p:sp>
+        </mc:Choice>
+        <mc:Fallback>
+          <p:sp>
+            <p:nvSpPr>
+              <p:cNvPr id="5" name="内容占位符 2">
+                <a:extLst>
+                  <a:ext uri="{FF2B5EF4-FFF2-40B4-BE49-F238E27FC236}">
+                    <a16:creationId xmlns:a16="http://schemas.microsoft.com/office/drawing/2014/main" id="{0BEC3563-0F13-4A96-BBEA-B7D1F6A386B6}"/>
+                  </a:ext>
+                </a:extLst>
+              </p:cNvPr>
+              <p:cNvSpPr txBox="1">
+                <a:spLocks noRot="1" noChangeAspect="1" noMove="1" noResize="1" noEditPoints="1" noAdjustHandles="1" noChangeArrowheads="1" noChangeShapeType="1" noTextEdit="1"/>
+              </p:cNvSpPr>
+              <p:nvPr/>
+            </p:nvSpPr>
+            <p:spPr>
+              <a:xfrm>
+                <a:off x="990600" y="1978025"/>
+                <a:ext cx="10515600" cy="4351338"/>
+              </a:xfrm>
+              <a:prstGeom prst="rect">
+                <a:avLst/>
+              </a:prstGeom>
+              <a:blipFill>
+                <a:blip r:embed="rId3"/>
+                <a:stretch>
+                  <a:fillRect l="-928" t="-1821" b="-1401"/>
+                </a:stretch>
+              </a:blipFill>
+            </p:spPr>
+            <p:txBody>
+              <a:bodyPr/>
+              <a:lstStyle/>
+              <a:p>
+                <a:r>
+                  <a:rPr lang="zh-CN" altLang="en-US">
+                    <a:noFill/>
+                  </a:rPr>
+                  <a:t> </a:t>
+                </a:r>
+              </a:p>
+            </p:txBody>
+          </p:sp>
+        </mc:Fallback>
+      </mc:AlternateContent>
+      <p:sp>
+        <p:nvSpPr>
+          <p:cNvPr id="3" name="矩形 2">
+            <a:extLst>
+              <a:ext uri="{FF2B5EF4-FFF2-40B4-BE49-F238E27FC236}">
+                <a16:creationId xmlns:a16="http://schemas.microsoft.com/office/drawing/2014/main" id="{13D07AB5-F3B8-B65A-CB85-140E024E79A3}"/>
+              </a:ext>
+            </a:extLst>
+          </p:cNvPr>
+          <p:cNvSpPr/>
+          <p:nvPr/>
+        </p:nvSpPr>
+        <p:spPr>
+          <a:xfrm>
+            <a:off x="1428110" y="2971802"/>
+            <a:ext cx="739739" cy="688368"/>
+          </a:xfrm>
+          <a:prstGeom prst="rect">
+            <a:avLst/>
+          </a:prstGeom>
+          <a:solidFill>
+            <a:schemeClr val="accent2">
+              <a:lumMod val="60000"/>
+              <a:lumOff val="40000"/>
+            </a:schemeClr>
+          </a:solidFill>
+          <a:ln>
+            <a:noFill/>
+          </a:ln>
+        </p:spPr>
+        <p:style>
+          <a:lnRef idx="2">
+            <a:schemeClr val="accent1">
+              <a:shade val="50000"/>
+            </a:schemeClr>
+          </a:lnRef>
+          <a:fillRef idx="1">
+            <a:schemeClr val="accent1"/>
+          </a:fillRef>
+          <a:effectRef idx="0">
+            <a:schemeClr val="accent1"/>
+          </a:effectRef>
+          <a:fontRef idx="minor">
+            <a:schemeClr val="lt1"/>
+          </a:fontRef>
+        </p:style>
+        <p:txBody>
+          <a:bodyPr rtlCol="0" anchor="ctr"/>
+          <a:lstStyle/>
+          <a:p>
+            <a:pPr algn="ctr"/>
+            <a:endParaRPr lang="zh-CN" altLang="en-US"/>
+          </a:p>
+        </p:txBody>
+      </p:sp>
+      <mc:AlternateContent xmlns:mc="http://schemas.openxmlformats.org/markup-compatibility/2006">
+        <mc:Choice xmlns:a14="http://schemas.microsoft.com/office/drawing/2010/main" Requires="a14">
+          <p:sp>
+            <p:nvSpPr>
+              <p:cNvPr id="15" name="箭头: 右 14">
+                <a:extLst>
+                  <a:ext uri="{FF2B5EF4-FFF2-40B4-BE49-F238E27FC236}">
+                    <a16:creationId xmlns:a16="http://schemas.microsoft.com/office/drawing/2014/main" id="{A59EE251-C00C-DD81-5A78-51EE6EA9EC63}"/>
+                  </a:ext>
+                </a:extLst>
+              </p:cNvPr>
+              <p:cNvSpPr/>
+              <p:nvPr/>
+            </p:nvSpPr>
+            <p:spPr>
+              <a:xfrm>
+                <a:off x="2769743" y="3028952"/>
+                <a:ext cx="1103617" cy="574068"/>
+              </a:xfrm>
+              <a:prstGeom prst="rightArrow">
+                <a:avLst/>
+              </a:prstGeom>
+            </p:spPr>
+            <p:style>
+              <a:lnRef idx="2">
+                <a:schemeClr val="accent1">
+                  <a:shade val="50000"/>
+                </a:schemeClr>
+              </a:lnRef>
+              <a:fillRef idx="1">
+                <a:schemeClr val="accent1"/>
+              </a:fillRef>
+              <a:effectRef idx="0">
+                <a:schemeClr val="accent1"/>
+              </a:effectRef>
+              <a:fontRef idx="minor">
+                <a:schemeClr val="lt1"/>
+              </a:fontRef>
+            </p:style>
+            <p:txBody>
+              <a:bodyPr rtlCol="0" anchor="ctr"/>
+              <a:lstStyle/>
+              <a:p>
+                <a:pPr algn="ctr"/>
+                <a14:m>
+                  <m:oMathPara xmlns:m="http://schemas.openxmlformats.org/officeDocument/2006/math">
+                    <m:oMathParaPr>
+                      <m:jc m:val="centerGroup"/>
+                    </m:oMathParaPr>
+                    <m:oMath xmlns:m="http://schemas.openxmlformats.org/officeDocument/2006/math">
+                      <m:sSup>
+                        <m:sSupPr>
+                          <m:ctrlPr>
+                            <a:rPr lang="en-US" altLang="zh-CN" i="1">
+                              <a:latin typeface="Cambria Math" panose="02040503050406030204" pitchFamily="18" charset="0"/>
+                            </a:rPr>
+                          </m:ctrlPr>
+                        </m:sSupPr>
+                        <m:e>
+                          <m:r>
+                            <a:rPr lang="en-US" altLang="zh-CN" i="1">
+                              <a:latin typeface="Cambria Math" panose="02040503050406030204" pitchFamily="18" charset="0"/>
+                            </a:rPr>
+                            <m:t>𝑉</m:t>
+                          </m:r>
+                        </m:e>
+                        <m:sup>
+                          <m:r>
+                            <a:rPr lang="en-US" altLang="zh-CN" i="1">
+                              <a:latin typeface="Cambria Math" panose="02040503050406030204" pitchFamily="18" charset="0"/>
+                            </a:rPr>
+                            <m:t>𝑇</m:t>
+                          </m:r>
+                        </m:sup>
+                      </m:sSup>
+                    </m:oMath>
+                  </m:oMathPara>
+                </a14:m>
+                <a:endParaRPr lang="zh-CN" altLang="en-US" dirty="0"/>
+              </a:p>
+            </p:txBody>
+          </p:sp>
+        </mc:Choice>
+        <mc:Fallback>
+          <p:sp>
+            <p:nvSpPr>
+              <p:cNvPr id="15" name="箭头: 右 14">
+                <a:extLst>
+                  <a:ext uri="{FF2B5EF4-FFF2-40B4-BE49-F238E27FC236}">
+                    <a16:creationId xmlns:a16="http://schemas.microsoft.com/office/drawing/2014/main" id="{A59EE251-C00C-DD81-5A78-51EE6EA9EC63}"/>
+                  </a:ext>
+                </a:extLst>
+              </p:cNvPr>
+              <p:cNvSpPr>
+                <a:spLocks noRot="1" noChangeAspect="1" noMove="1" noResize="1" noEditPoints="1" noAdjustHandles="1" noChangeArrowheads="1" noChangeShapeType="1" noTextEdit="1"/>
+              </p:cNvSpPr>
+              <p:nvPr/>
+            </p:nvSpPr>
+            <p:spPr>
+              <a:xfrm>
+                <a:off x="2769743" y="3028952"/>
+                <a:ext cx="1103617" cy="574068"/>
+              </a:xfrm>
+              <a:prstGeom prst="rightArrow">
+                <a:avLst/>
+              </a:prstGeom>
+              <a:blipFill>
+                <a:blip r:embed="rId4"/>
+                <a:stretch>
+                  <a:fillRect/>
+                </a:stretch>
+              </a:blipFill>
+            </p:spPr>
+            <p:txBody>
+              <a:bodyPr/>
+              <a:lstStyle/>
+              <a:p>
+                <a:r>
+                  <a:rPr lang="zh-CN" altLang="en-US">
+                    <a:noFill/>
+                  </a:rPr>
+                  <a:t> </a:t>
+                </a:r>
+              </a:p>
+            </p:txBody>
+          </p:sp>
+        </mc:Fallback>
+      </mc:AlternateContent>
+      <p:sp>
+        <p:nvSpPr>
+          <p:cNvPr id="16" name="矩形 15">
+            <a:extLst>
+              <a:ext uri="{FF2B5EF4-FFF2-40B4-BE49-F238E27FC236}">
+                <a16:creationId xmlns:a16="http://schemas.microsoft.com/office/drawing/2014/main" id="{FDFC0BD8-A583-1973-A2D6-2B9A3511A393}"/>
+              </a:ext>
+            </a:extLst>
+          </p:cNvPr>
+          <p:cNvSpPr/>
+          <p:nvPr/>
+        </p:nvSpPr>
+        <p:spPr>
+          <a:xfrm rot="2669341">
+            <a:off x="4486555" y="2953317"/>
+            <a:ext cx="739739" cy="683963"/>
+          </a:xfrm>
+          <a:prstGeom prst="rect">
+            <a:avLst/>
+          </a:prstGeom>
+          <a:solidFill>
+            <a:schemeClr val="accent2">
+              <a:lumMod val="60000"/>
+              <a:lumOff val="40000"/>
+            </a:schemeClr>
+          </a:solidFill>
+          <a:ln>
+            <a:noFill/>
+          </a:ln>
+        </p:spPr>
+        <p:style>
+          <a:lnRef idx="2">
+            <a:schemeClr val="accent1">
+              <a:shade val="50000"/>
+            </a:schemeClr>
+          </a:lnRef>
+          <a:fillRef idx="1">
+            <a:schemeClr val="accent1"/>
+          </a:fillRef>
+          <a:effectRef idx="0">
+            <a:schemeClr val="accent1"/>
+          </a:effectRef>
+          <a:fontRef idx="minor">
+            <a:schemeClr val="lt1"/>
+          </a:fontRef>
+        </p:style>
+        <p:txBody>
+          <a:bodyPr rtlCol="0" anchor="ctr"/>
+          <a:lstStyle/>
+          <a:p>
+            <a:pPr algn="ctr"/>
+            <a:endParaRPr lang="zh-CN" altLang="en-US"/>
+          </a:p>
+        </p:txBody>
+      </p:sp>
+      <mc:AlternateContent xmlns:mc="http://schemas.openxmlformats.org/markup-compatibility/2006">
+        <mc:Choice xmlns:a14="http://schemas.microsoft.com/office/drawing/2010/main" Requires="a14">
+          <p:sp>
+            <p:nvSpPr>
+              <p:cNvPr id="17" name="箭头: 右 16">
+                <a:extLst>
+                  <a:ext uri="{FF2B5EF4-FFF2-40B4-BE49-F238E27FC236}">
+                    <a16:creationId xmlns:a16="http://schemas.microsoft.com/office/drawing/2014/main" id="{CBFBD71C-95F8-2B7F-E290-F301A13CFE75}"/>
+                  </a:ext>
+                </a:extLst>
+              </p:cNvPr>
+              <p:cNvSpPr/>
+              <p:nvPr/>
+            </p:nvSpPr>
+            <p:spPr>
+              <a:xfrm>
+                <a:off x="5788633" y="3027242"/>
+                <a:ext cx="1103617" cy="574068"/>
+              </a:xfrm>
+              <a:prstGeom prst="rightArrow">
+                <a:avLst/>
+              </a:prstGeom>
+            </p:spPr>
+            <p:style>
+              <a:lnRef idx="2">
+                <a:schemeClr val="accent1">
+                  <a:shade val="50000"/>
+                </a:schemeClr>
+              </a:lnRef>
+              <a:fillRef idx="1">
+                <a:schemeClr val="accent1"/>
+              </a:fillRef>
+              <a:effectRef idx="0">
+                <a:schemeClr val="accent1"/>
+              </a:effectRef>
+              <a:fontRef idx="minor">
+                <a:schemeClr val="lt1"/>
+              </a:fontRef>
+            </p:style>
+            <p:txBody>
+              <a:bodyPr rtlCol="0" anchor="ctr"/>
+              <a:lstStyle/>
+              <a:p>
+                <a:pPr algn="ctr"/>
+                <a14:m>
+                  <m:oMathPara xmlns:m="http://schemas.openxmlformats.org/officeDocument/2006/math">
+                    <m:oMathParaPr>
+                      <m:jc m:val="centerGroup"/>
+                    </m:oMathParaPr>
+                    <m:oMath xmlns:m="http://schemas.openxmlformats.org/officeDocument/2006/math">
+                      <m:r>
+                        <a:rPr lang="en-US" altLang="zh-CN" b="0" i="1" smtClean="0">
+                          <a:latin typeface="Cambria Math" panose="02040503050406030204" pitchFamily="18" charset="0"/>
+                        </a:rPr>
+                        <m:t>𝐷</m:t>
+                      </m:r>
+                    </m:oMath>
+                  </m:oMathPara>
+                </a14:m>
+                <a:endParaRPr lang="zh-CN" altLang="en-US" dirty="0"/>
+              </a:p>
+            </p:txBody>
+          </p:sp>
+        </mc:Choice>
+        <mc:Fallback>
+          <p:sp>
+            <p:nvSpPr>
+              <p:cNvPr id="17" name="箭头: 右 16">
+                <a:extLst>
+                  <a:ext uri="{FF2B5EF4-FFF2-40B4-BE49-F238E27FC236}">
+                    <a16:creationId xmlns:a16="http://schemas.microsoft.com/office/drawing/2014/main" id="{CBFBD71C-95F8-2B7F-E290-F301A13CFE75}"/>
+                  </a:ext>
+                </a:extLst>
+              </p:cNvPr>
+              <p:cNvSpPr>
+                <a:spLocks noRot="1" noChangeAspect="1" noMove="1" noResize="1" noEditPoints="1" noAdjustHandles="1" noChangeArrowheads="1" noChangeShapeType="1" noTextEdit="1"/>
+              </p:cNvSpPr>
+              <p:nvPr/>
+            </p:nvSpPr>
+            <p:spPr>
+              <a:xfrm>
+                <a:off x="5788633" y="3027242"/>
+                <a:ext cx="1103617" cy="574068"/>
+              </a:xfrm>
+              <a:prstGeom prst="rightArrow">
+                <a:avLst/>
+              </a:prstGeom>
+              <a:blipFill>
+                <a:blip r:embed="rId5"/>
+                <a:stretch>
+                  <a:fillRect/>
+                </a:stretch>
+              </a:blipFill>
+            </p:spPr>
+            <p:txBody>
+              <a:bodyPr/>
+              <a:lstStyle/>
+              <a:p>
+                <a:r>
+                  <a:rPr lang="zh-CN" altLang="en-US">
+                    <a:noFill/>
+                  </a:rPr>
+                  <a:t> </a:t>
+                </a:r>
+              </a:p>
+            </p:txBody>
+          </p:sp>
+        </mc:Fallback>
+      </mc:AlternateContent>
+      <p:sp>
+        <p:nvSpPr>
+          <p:cNvPr id="18" name="菱形 17">
+            <a:extLst>
+              <a:ext uri="{FF2B5EF4-FFF2-40B4-BE49-F238E27FC236}">
+                <a16:creationId xmlns:a16="http://schemas.microsoft.com/office/drawing/2014/main" id="{F90265CE-72B8-0F97-E21C-1F84218BE7F5}"/>
+              </a:ext>
+            </a:extLst>
+          </p:cNvPr>
+          <p:cNvSpPr/>
+          <p:nvPr/>
+        </p:nvSpPr>
+        <p:spPr>
+          <a:xfrm>
+            <a:off x="7305440" y="2811116"/>
+            <a:ext cx="479119" cy="1006320"/>
+          </a:xfrm>
+          <a:prstGeom prst="diamond">
+            <a:avLst/>
+          </a:prstGeom>
+          <a:solidFill>
+            <a:schemeClr val="accent2">
+              <a:lumMod val="60000"/>
+              <a:lumOff val="40000"/>
+            </a:schemeClr>
+          </a:solidFill>
+          <a:ln>
+            <a:noFill/>
+          </a:ln>
+        </p:spPr>
+        <p:style>
+          <a:lnRef idx="2">
+            <a:schemeClr val="accent1">
+              <a:shade val="50000"/>
+            </a:schemeClr>
+          </a:lnRef>
+          <a:fillRef idx="1">
+            <a:schemeClr val="accent1"/>
+          </a:fillRef>
+          <a:effectRef idx="0">
+            <a:schemeClr val="accent1"/>
+          </a:effectRef>
+          <a:fontRef idx="minor">
+            <a:schemeClr val="lt1"/>
+          </a:fontRef>
+        </p:style>
+        <p:txBody>
+          <a:bodyPr rtlCol="0" anchor="ctr"/>
+          <a:lstStyle/>
+          <a:p>
+            <a:pPr algn="ctr"/>
+            <a:endParaRPr lang="zh-CN" altLang="en-US"/>
+          </a:p>
+        </p:txBody>
+      </p:sp>
+      <mc:AlternateContent xmlns:mc="http://schemas.openxmlformats.org/markup-compatibility/2006">
+        <mc:Choice xmlns:a14="http://schemas.microsoft.com/office/drawing/2010/main" Requires="a14">
+          <p:sp>
+            <p:nvSpPr>
+              <p:cNvPr id="19" name="箭头: 右 18">
+                <a:extLst>
+                  <a:ext uri="{FF2B5EF4-FFF2-40B4-BE49-F238E27FC236}">
+                    <a16:creationId xmlns:a16="http://schemas.microsoft.com/office/drawing/2014/main" id="{5DC1B81A-1146-7AD0-1688-940E714F77BF}"/>
+                  </a:ext>
+                </a:extLst>
+              </p:cNvPr>
+              <p:cNvSpPr/>
+              <p:nvPr/>
+            </p:nvSpPr>
+            <p:spPr>
+              <a:xfrm>
+                <a:off x="8293817" y="3035806"/>
+                <a:ext cx="1103617" cy="574068"/>
+              </a:xfrm>
+              <a:prstGeom prst="rightArrow">
+                <a:avLst/>
+              </a:prstGeom>
+            </p:spPr>
+            <p:style>
+              <a:lnRef idx="2">
+                <a:schemeClr val="accent1">
+                  <a:shade val="50000"/>
+                </a:schemeClr>
+              </a:lnRef>
+              <a:fillRef idx="1">
+                <a:schemeClr val="accent1"/>
+              </a:fillRef>
+              <a:effectRef idx="0">
+                <a:schemeClr val="accent1"/>
+              </a:effectRef>
+              <a:fontRef idx="minor">
+                <a:schemeClr val="lt1"/>
+              </a:fontRef>
+            </p:style>
+            <p:txBody>
+              <a:bodyPr rtlCol="0" anchor="ctr"/>
+              <a:lstStyle/>
+              <a:p>
+                <a:pPr algn="ctr"/>
+                <a14:m>
+                  <m:oMathPara xmlns:m="http://schemas.openxmlformats.org/officeDocument/2006/math">
+                    <m:oMathParaPr>
+                      <m:jc m:val="centerGroup"/>
+                    </m:oMathParaPr>
+                    <m:oMath xmlns:m="http://schemas.openxmlformats.org/officeDocument/2006/math">
+                      <m:r>
+                        <m:rPr>
+                          <m:sty m:val="p"/>
+                        </m:rPr>
+                        <a:rPr lang="en-US" altLang="zh-CN" i="1">
+                          <a:latin typeface="Cambria Math" panose="02040503050406030204" pitchFamily="18" charset="0"/>
+                        </a:rPr>
+                        <m:t>U</m:t>
+                      </m:r>
+                    </m:oMath>
+                  </m:oMathPara>
+                </a14:m>
+                <a:endParaRPr lang="zh-CN" altLang="en-US" dirty="0"/>
+              </a:p>
+            </p:txBody>
+          </p:sp>
+        </mc:Choice>
+        <mc:Fallback>
+          <p:sp>
+            <p:nvSpPr>
+              <p:cNvPr id="19" name="箭头: 右 18">
+                <a:extLst>
+                  <a:ext uri="{FF2B5EF4-FFF2-40B4-BE49-F238E27FC236}">
+                    <a16:creationId xmlns:a16="http://schemas.microsoft.com/office/drawing/2014/main" id="{5DC1B81A-1146-7AD0-1688-940E714F77BF}"/>
+                  </a:ext>
+                </a:extLst>
+              </p:cNvPr>
+              <p:cNvSpPr>
+                <a:spLocks noRot="1" noChangeAspect="1" noMove="1" noResize="1" noEditPoints="1" noAdjustHandles="1" noChangeArrowheads="1" noChangeShapeType="1" noTextEdit="1"/>
+              </p:cNvSpPr>
+              <p:nvPr/>
+            </p:nvSpPr>
+            <p:spPr>
+              <a:xfrm>
+                <a:off x="8293817" y="3035806"/>
+                <a:ext cx="1103617" cy="574068"/>
+              </a:xfrm>
+              <a:prstGeom prst="rightArrow">
+                <a:avLst/>
+              </a:prstGeom>
+              <a:blipFill>
+                <a:blip r:embed="rId6"/>
+                <a:stretch>
+                  <a:fillRect/>
+                </a:stretch>
+              </a:blipFill>
+            </p:spPr>
+            <p:txBody>
+              <a:bodyPr/>
+              <a:lstStyle/>
+              <a:p>
+                <a:r>
+                  <a:rPr lang="zh-CN" altLang="en-US">
+                    <a:noFill/>
+                  </a:rPr>
+                  <a:t> </a:t>
+                </a:r>
+              </a:p>
+            </p:txBody>
+          </p:sp>
+        </mc:Fallback>
+      </mc:AlternateContent>
+      <p:sp>
+        <p:nvSpPr>
+          <p:cNvPr id="20" name="菱形 19">
+            <a:extLst>
+              <a:ext uri="{FF2B5EF4-FFF2-40B4-BE49-F238E27FC236}">
+                <a16:creationId xmlns:a16="http://schemas.microsoft.com/office/drawing/2014/main" id="{E2971DAF-6A7B-C74E-3AEF-74D3F8C2E738}"/>
+              </a:ext>
+            </a:extLst>
+          </p:cNvPr>
+          <p:cNvSpPr/>
+          <p:nvPr/>
+        </p:nvSpPr>
+        <p:spPr>
+          <a:xfrm rot="17850332">
+            <a:off x="9956003" y="2811116"/>
+            <a:ext cx="479119" cy="1006320"/>
+          </a:xfrm>
+          <a:prstGeom prst="diamond">
+            <a:avLst/>
+          </a:prstGeom>
+          <a:solidFill>
+            <a:schemeClr val="accent2">
+              <a:lumMod val="60000"/>
+              <a:lumOff val="40000"/>
+            </a:schemeClr>
+          </a:solidFill>
+          <a:ln>
+            <a:noFill/>
+          </a:ln>
+        </p:spPr>
+        <p:style>
+          <a:lnRef idx="2">
+            <a:schemeClr val="accent1">
+              <a:shade val="50000"/>
+            </a:schemeClr>
+          </a:lnRef>
+          <a:fillRef idx="1">
+            <a:schemeClr val="accent1"/>
+          </a:fillRef>
+          <a:effectRef idx="0">
+            <a:schemeClr val="accent1"/>
+          </a:effectRef>
+          <a:fontRef idx="minor">
+            <a:schemeClr val="lt1"/>
+          </a:fontRef>
+        </p:style>
+        <p:txBody>
+          <a:bodyPr rtlCol="0" anchor="ctr"/>
+          <a:lstStyle/>
+          <a:p>
+            <a:pPr algn="ctr"/>
+            <a:endParaRPr lang="zh-CN" altLang="en-US"/>
+          </a:p>
+        </p:txBody>
+      </p:sp>
+      <p:sp>
+        <p:nvSpPr>
+          <p:cNvPr id="21" name="矩形: 圆角 20">
+            <a:extLst>
+              <a:ext uri="{FF2B5EF4-FFF2-40B4-BE49-F238E27FC236}">
+                <a16:creationId xmlns:a16="http://schemas.microsoft.com/office/drawing/2014/main" id="{F5BC45F4-34B6-0F55-A9F7-7A25828E7035}"/>
+              </a:ext>
+            </a:extLst>
+          </p:cNvPr>
+          <p:cNvSpPr/>
+          <p:nvPr/>
+        </p:nvSpPr>
+        <p:spPr>
+          <a:xfrm>
+            <a:off x="1208843" y="2735492"/>
+            <a:ext cx="6922642" cy="1284276"/>
+          </a:xfrm>
+          <a:prstGeom prst="roundRect">
+            <a:avLst/>
+          </a:prstGeom>
+          <a:noFill/>
+          <a:ln w="38100" cap="flat" cmpd="sng" algn="ctr">
+            <a:solidFill>
+              <a:srgbClr val="4472C4"/>
+            </a:solidFill>
+            <a:prstDash val="dash"/>
+            <a:round/>
+            <a:headEnd type="none" w="med" len="med"/>
+            <a:tailEnd type="none" w="med" len="med"/>
+          </a:ln>
+        </p:spPr>
+        <p:style>
+          <a:lnRef idx="0">
+            <a:scrgbClr r="0" g="0" b="0"/>
+          </a:lnRef>
+          <a:fillRef idx="0">
+            <a:scrgbClr r="0" g="0" b="0"/>
+          </a:fillRef>
+          <a:effectRef idx="0">
+            <a:scrgbClr r="0" g="0" b="0"/>
+          </a:effectRef>
+          <a:fontRef idx="minor">
+            <a:schemeClr val="accent1"/>
+          </a:fontRef>
+        </p:style>
+        <p:txBody>
+          <a:bodyPr rtlCol="0" anchor="ctr"/>
+          <a:lstStyle/>
+          <a:p>
+            <a:pPr algn="ctr"/>
+            <a:r>
+              <a:rPr lang="en-US" altLang="zh-CN" dirty="0"/>
+              <a:t>s</a:t>
+            </a:r>
+            <a:endParaRPr lang="zh-CN" altLang="en-US" dirty="0"/>
+          </a:p>
+        </p:txBody>
+      </p:sp>
+      <p:sp>
+        <p:nvSpPr>
+          <p:cNvPr id="22" name="文本框 21">
+            <a:extLst>
+              <a:ext uri="{FF2B5EF4-FFF2-40B4-BE49-F238E27FC236}">
+                <a16:creationId xmlns:a16="http://schemas.microsoft.com/office/drawing/2014/main" id="{71B08515-3F88-4FB1-DB2A-05EA2CEC6DC4}"/>
+              </a:ext>
+            </a:extLst>
+          </p:cNvPr>
+          <p:cNvSpPr txBox="1"/>
+          <p:nvPr/>
+        </p:nvSpPr>
+        <p:spPr>
+          <a:xfrm>
+            <a:off x="8736508" y="4632249"/>
+            <a:ext cx="1459054" cy="369332"/>
+          </a:xfrm>
+          <a:prstGeom prst="rect">
+            <a:avLst/>
+          </a:prstGeom>
+          <a:noFill/>
+        </p:spPr>
+        <p:txBody>
+          <a:bodyPr wrap="none" rtlCol="0">
+            <a:spAutoFit/>
+          </a:bodyPr>
+          <a:lstStyle/>
+          <a:p>
+            <a:r>
+              <a:rPr lang="en-US" altLang="zh-CN" b="1" dirty="0">
+                <a:solidFill>
+                  <a:schemeClr val="accent6">
+                    <a:lumMod val="75000"/>
+                  </a:schemeClr>
+                </a:solidFill>
+              </a:rPr>
+              <a:t>Green strain</a:t>
+            </a:r>
+            <a:endParaRPr lang="zh-CN" altLang="en-US" b="1" dirty="0">
+              <a:solidFill>
+                <a:schemeClr val="accent6">
+                  <a:lumMod val="75000"/>
+                </a:schemeClr>
+              </a:solidFill>
+            </a:endParaRPr>
+          </a:p>
+        </p:txBody>
+      </p:sp>
+    </p:spTree>
+    <p:extLst>
+      <p:ext uri="{BB962C8B-B14F-4D97-AF65-F5344CB8AC3E}">
+        <p14:creationId xmlns:p14="http://schemas.microsoft.com/office/powerpoint/2010/main" val="2750577522"/>
       </p:ext>
     </p:extLst>
   </p:cSld>
@@ -21506,4 +24353,299 @@
     </a:ext>
   </a:extLst>
 </a:theme>
+</file>
+
+<file path=ppt/theme/theme2.xml><?xml version="1.0" encoding="utf-8"?>
+<a:theme xmlns:a="http://schemas.openxmlformats.org/drawingml/2006/main" name="Office 主题​​">
+  <a:themeElements>
+    <a:clrScheme name="Office">
+      <a:dk1>
+        <a:sysClr val="windowText" lastClr="000000"/>
+      </a:dk1>
+      <a:lt1>
+        <a:sysClr val="window" lastClr="FFFFFF"/>
+      </a:lt1>
+      <a:dk2>
+        <a:srgbClr val="44546A"/>
+      </a:dk2>
+      <a:lt2>
+        <a:srgbClr val="E7E6E6"/>
+      </a:lt2>
+      <a:accent1>
+        <a:srgbClr val="4472C4"/>
+      </a:accent1>
+      <a:accent2>
+        <a:srgbClr val="ED7D31"/>
+      </a:accent2>
+      <a:accent3>
+        <a:srgbClr val="A5A5A5"/>
+      </a:accent3>
+      <a:accent4>
+        <a:srgbClr val="FFC000"/>
+      </a:accent4>
+      <a:accent5>
+        <a:srgbClr val="5B9BD5"/>
+      </a:accent5>
+      <a:accent6>
+        <a:srgbClr val="70AD47"/>
+      </a:accent6>
+      <a:hlink>
+        <a:srgbClr val="0563C1"/>
+      </a:hlink>
+      <a:folHlink>
+        <a:srgbClr val="954F72"/>
+      </a:folHlink>
+    </a:clrScheme>
+    <a:fontScheme name="Office">
+      <a:majorFont>
+        <a:latin typeface="等线 Light" panose="020F0302020204030204"/>
+        <a:ea typeface=""/>
+        <a:cs typeface=""/>
+        <a:font script="Jpan" typeface="游ゴシック Light"/>
+        <a:font script="Hang" typeface="맑은 고딕"/>
+        <a:font script="Hans" typeface="等线 Light"/>
+        <a:font script="Hant" typeface="新細明體"/>
+        <a:font script="Arab" typeface="Times New Roman"/>
+        <a:font script="Hebr" typeface="Times New Roman"/>
+        <a:font script="Thai" typeface="Angsana New"/>
+        <a:font script="Ethi" typeface="Nyala"/>
+        <a:font script="Beng" typeface="Vrinda"/>
+        <a:font script="Gujr" typeface="Shruti"/>
+        <a:font script="Khmr" typeface="MoolBoran"/>
+        <a:font script="Knda" typeface="Tunga"/>
+        <a:font script="Guru" typeface="Raavi"/>
+        <a:font script="Cans" typeface="Euphemia"/>
+        <a:font script="Cher" typeface="Plantagenet Cherokee"/>
+        <a:font script="Yiii" typeface="Microsoft Yi Baiti"/>
+        <a:font script="Tibt" typeface="Microsoft Himalaya"/>
+        <a:font script="Thaa" typeface="MV Boli"/>
+        <a:font script="Deva" typeface="Mangal"/>
+        <a:font script="Telu" typeface="Gautami"/>
+        <a:font script="Taml" typeface="Latha"/>
+        <a:font script="Syrc" typeface="Estrangelo Edessa"/>
+        <a:font script="Orya" typeface="Kalinga"/>
+        <a:font script="Mlym" typeface="Kartika"/>
+        <a:font script="Laoo" typeface="DokChampa"/>
+        <a:font script="Sinh" typeface="Iskoola Pota"/>
+        <a:font script="Mong" typeface="Mongolian Baiti"/>
+        <a:font script="Viet" typeface="Times New Roman"/>
+        <a:font script="Uigh" typeface="Microsoft Uighur"/>
+        <a:font script="Geor" typeface="Sylfaen"/>
+        <a:font script="Armn" typeface="Arial"/>
+        <a:font script="Bugi" typeface="Leelawadee UI"/>
+        <a:font script="Bopo" typeface="Microsoft JhengHei"/>
+        <a:font script="Java" typeface="Javanese Text"/>
+        <a:font script="Lisu" typeface="Segoe UI"/>
+        <a:font script="Mymr" typeface="Myanmar Text"/>
+        <a:font script="Nkoo" typeface="Ebrima"/>
+        <a:font script="Olck" typeface="Nirmala UI"/>
+        <a:font script="Osma" typeface="Ebrima"/>
+        <a:font script="Phag" typeface="Phagspa"/>
+        <a:font script="Syrn" typeface="Estrangelo Edessa"/>
+        <a:font script="Syrj" typeface="Estrangelo Edessa"/>
+        <a:font script="Syre" typeface="Estrangelo Edessa"/>
+        <a:font script="Sora" typeface="Nirmala UI"/>
+        <a:font script="Tale" typeface="Microsoft Tai Le"/>
+        <a:font script="Talu" typeface="Microsoft New Tai Lue"/>
+        <a:font script="Tfng" typeface="Ebrima"/>
+      </a:majorFont>
+      <a:minorFont>
+        <a:latin typeface="等线" panose="020F0502020204030204"/>
+        <a:ea typeface=""/>
+        <a:cs typeface=""/>
+        <a:font script="Jpan" typeface="游ゴシック"/>
+        <a:font script="Hang" typeface="맑은 고딕"/>
+        <a:font script="Hans" typeface="等线"/>
+        <a:font script="Hant" typeface="新細明體"/>
+        <a:font script="Arab" typeface="Arial"/>
+        <a:font script="Hebr" typeface="Arial"/>
+        <a:font script="Thai" typeface="Cordia New"/>
+        <a:font script="Ethi" typeface="Nyala"/>
+        <a:font script="Beng" typeface="Vrinda"/>
+        <a:font script="Gujr" typeface="Shruti"/>
+        <a:font script="Khmr" typeface="DaunPenh"/>
+        <a:font script="Knda" typeface="Tunga"/>
+        <a:font script="Guru" typeface="Raavi"/>
+        <a:font script="Cans" typeface="Euphemia"/>
+        <a:font script="Cher" typeface="Plantagenet Cherokee"/>
+        <a:font script="Yiii" typeface="Microsoft Yi Baiti"/>
+        <a:font script="Tibt" typeface="Microsoft Himalaya"/>
+        <a:font script="Thaa" typeface="MV Boli"/>
+        <a:font script="Deva" typeface="Mangal"/>
+        <a:font script="Telu" typeface="Gautami"/>
+        <a:font script="Taml" typeface="Latha"/>
+        <a:font script="Syrc" typeface="Estrangelo Edessa"/>
+        <a:font script="Orya" typeface="Kalinga"/>
+        <a:font script="Mlym" typeface="Kartika"/>
+        <a:font script="Laoo" typeface="DokChampa"/>
+        <a:font script="Sinh" typeface="Iskoola Pota"/>
+        <a:font script="Mong" typeface="Mongolian Baiti"/>
+        <a:font script="Viet" typeface="Arial"/>
+        <a:font script="Uigh" typeface="Microsoft Uighur"/>
+        <a:font script="Geor" typeface="Sylfaen"/>
+        <a:font script="Armn" typeface="Arial"/>
+        <a:font script="Bugi" typeface="Leelawadee UI"/>
+        <a:font script="Bopo" typeface="Microsoft JhengHei"/>
+        <a:font script="Java" typeface="Javanese Text"/>
+        <a:font script="Lisu" typeface="Segoe UI"/>
+        <a:font script="Mymr" typeface="Myanmar Text"/>
+        <a:font script="Nkoo" typeface="Ebrima"/>
+        <a:font script="Olck" typeface="Nirmala UI"/>
+        <a:font script="Osma" typeface="Ebrima"/>
+        <a:font script="Phag" typeface="Phagspa"/>
+        <a:font script="Syrn" typeface="Estrangelo Edessa"/>
+        <a:font script="Syrj" typeface="Estrangelo Edessa"/>
+        <a:font script="Syre" typeface="Estrangelo Edessa"/>
+        <a:font script="Sora" typeface="Nirmala UI"/>
+        <a:font script="Tale" typeface="Microsoft Tai Le"/>
+        <a:font script="Talu" typeface="Microsoft New Tai Lue"/>
+        <a:font script="Tfng" typeface="Ebrima"/>
+      </a:minorFont>
+    </a:fontScheme>
+    <a:fmtScheme name="Office">
+      <a:fillStyleLst>
+        <a:solidFill>
+          <a:schemeClr val="phClr"/>
+        </a:solidFill>
+        <a:gradFill rotWithShape="1">
+          <a:gsLst>
+            <a:gs pos="0">
+              <a:schemeClr val="phClr">
+                <a:lumMod val="110000"/>
+                <a:satMod val="105000"/>
+                <a:tint val="67000"/>
+              </a:schemeClr>
+            </a:gs>
+            <a:gs pos="50000">
+              <a:schemeClr val="phClr">
+                <a:lumMod val="105000"/>
+                <a:satMod val="103000"/>
+                <a:tint val="73000"/>
+              </a:schemeClr>
+            </a:gs>
+            <a:gs pos="100000">
+              <a:schemeClr val="phClr">
+                <a:lumMod val="105000"/>
+                <a:satMod val="109000"/>
+                <a:tint val="81000"/>
+              </a:schemeClr>
+            </a:gs>
+          </a:gsLst>
+          <a:lin ang="5400000" scaled="0"/>
+        </a:gradFill>
+        <a:gradFill rotWithShape="1">
+          <a:gsLst>
+            <a:gs pos="0">
+              <a:schemeClr val="phClr">
+                <a:satMod val="103000"/>
+                <a:lumMod val="102000"/>
+                <a:tint val="94000"/>
+              </a:schemeClr>
+            </a:gs>
+            <a:gs pos="50000">
+              <a:schemeClr val="phClr">
+                <a:satMod val="110000"/>
+                <a:lumMod val="100000"/>
+                <a:shade val="100000"/>
+              </a:schemeClr>
+            </a:gs>
+            <a:gs pos="100000">
+              <a:schemeClr val="phClr">
+                <a:lumMod val="99000"/>
+                <a:satMod val="120000"/>
+                <a:shade val="78000"/>
+              </a:schemeClr>
+            </a:gs>
+          </a:gsLst>
+          <a:lin ang="5400000" scaled="0"/>
+        </a:gradFill>
+      </a:fillStyleLst>
+      <a:lnStyleLst>
+        <a:ln w="6350" cap="flat" cmpd="sng" algn="ctr">
+          <a:solidFill>
+            <a:schemeClr val="phClr"/>
+          </a:solidFill>
+          <a:prstDash val="solid"/>
+          <a:miter lim="800000"/>
+        </a:ln>
+        <a:ln w="12700" cap="flat" cmpd="sng" algn="ctr">
+          <a:solidFill>
+            <a:schemeClr val="phClr"/>
+          </a:solidFill>
+          <a:prstDash val="solid"/>
+          <a:miter lim="800000"/>
+        </a:ln>
+        <a:ln w="19050" cap="flat" cmpd="sng" algn="ctr">
+          <a:solidFill>
+            <a:schemeClr val="phClr"/>
+          </a:solidFill>
+          <a:prstDash val="solid"/>
+          <a:miter lim="800000"/>
+        </a:ln>
+      </a:lnStyleLst>
+      <a:effectStyleLst>
+        <a:effectStyle>
+          <a:effectLst/>
+        </a:effectStyle>
+        <a:effectStyle>
+          <a:effectLst/>
+        </a:effectStyle>
+        <a:effectStyle>
+          <a:effectLst>
+            <a:outerShdw blurRad="57150" dist="19050" dir="5400000" algn="ctr" rotWithShape="0">
+              <a:srgbClr val="000000">
+                <a:alpha val="63000"/>
+              </a:srgbClr>
+            </a:outerShdw>
+          </a:effectLst>
+        </a:effectStyle>
+      </a:effectStyleLst>
+      <a:bgFillStyleLst>
+        <a:solidFill>
+          <a:schemeClr val="phClr"/>
+        </a:solidFill>
+        <a:solidFill>
+          <a:schemeClr val="phClr">
+            <a:tint val="95000"/>
+            <a:satMod val="170000"/>
+          </a:schemeClr>
+        </a:solidFill>
+        <a:gradFill rotWithShape="1">
+          <a:gsLst>
+            <a:gs pos="0">
+              <a:schemeClr val="phClr">
+                <a:tint val="93000"/>
+                <a:satMod val="150000"/>
+                <a:shade val="98000"/>
+                <a:lumMod val="102000"/>
+              </a:schemeClr>
+            </a:gs>
+            <a:gs pos="50000">
+              <a:schemeClr val="phClr">
+                <a:tint val="98000"/>
+                <a:satMod val="130000"/>
+                <a:shade val="90000"/>
+                <a:lumMod val="103000"/>
+              </a:schemeClr>
+            </a:gs>
+            <a:gs pos="100000">
+              <a:schemeClr val="phClr">
+                <a:shade val="63000"/>
+                <a:satMod val="120000"/>
+              </a:schemeClr>
+            </a:gs>
+          </a:gsLst>
+          <a:lin ang="5400000" scaled="0"/>
+        </a:gradFill>
+      </a:bgFillStyleLst>
+    </a:fmtScheme>
+  </a:themeElements>
+  <a:objectDefaults/>
+  <a:extraClrSchemeLst/>
+  <a:extLst>
+    <a:ext uri="{05A4C25C-085E-4340-85A3-A5531E510DB2}">
+      <thm15:themeFamily xmlns:thm15="http://schemas.microsoft.com/office/thememl/2012/main" name="Office Theme" id="{62F939B6-93AF-4DB8-9C6B-D6C7DFDC589F}" vid="{4A3C46E8-61CC-4603-A589-7422A47A8E4A}"/>
+    </a:ext>
+  </a:extLst>
+</a:theme>
 </file>
</xml_diff>